<commit_message>
chore(zip): remove unneeded images
</commit_message>
<xml_diff>
--- a/__tests__/pptx-templates/ChartScatter.pptx
+++ b/__tests__/pptx-templates/ChartScatter.pptx
@@ -7,6 +7,7 @@
   <p:sldIdLst>
     <p:sldId id="256" r:id="rId2"/>
     <p:sldId id="257" r:id="rId3"/>
+    <p:sldId id="258" r:id="rId4"/>
   </p:sldIdLst>
   <p:sldSz cx="12192000" cy="6858000"/>
   <p:notesSz cx="6858000" cy="9144000"/>
@@ -219,7 +220,7 @@
                   <a:bodyPr/>
                   <a:lstStyle/>
                   <a:p>
-                    <a:fld id="{03B91B2C-B5E7-4390-8142-3E6B8EBC3D59}" type="CELLRANGE">
+                    <a:fld id="{6B399F7B-3A83-4DA1-B6DB-4031FC4DC367}" type="CELLRANGE">
                       <a:rPr lang="de-DE"/>
                       <a:pPr/>
                       <a:t>[ZELLBEREICH]</a:t>
@@ -252,7 +253,7 @@
                   <a:bodyPr/>
                   <a:lstStyle/>
                   <a:p>
-                    <a:fld id="{B46B890F-AFDC-4520-9EFE-EF0C6B6A8ED7}" type="CELLRANGE">
+                    <a:fld id="{CBED623B-9426-472F-BC3A-E212B02883DE}" type="CELLRANGE">
                       <a:rPr lang="de-DE"/>
                       <a:pPr/>
                       <a:t>[ZELLBEREICH]</a:t>
@@ -285,7 +286,7 @@
                   <a:bodyPr/>
                   <a:lstStyle/>
                   <a:p>
-                    <a:fld id="{E0BE82C3-5E51-44D6-9F74-86257D5A6FF9}" type="CELLRANGE">
+                    <a:fld id="{04936111-54BC-43C3-9899-E544CA1FCE66}" type="CELLRANGE">
                       <a:rPr lang="de-DE"/>
                       <a:pPr/>
                       <a:t>[ZELLBEREICH]</a:t>
@@ -318,7 +319,7 @@
                   <a:bodyPr/>
                   <a:lstStyle/>
                   <a:p>
-                    <a:fld id="{29D708F0-D441-431E-BB09-44262BB82D5C}" type="CELLRANGE">
+                    <a:fld id="{A52D54D1-656B-42BB-B6BF-D22995F007AB}" type="CELLRANGE">
                       <a:rPr lang="de-DE"/>
                       <a:pPr/>
                       <a:t>[ZELLBEREICH]</a:t>
@@ -555,7 +556,7 @@
                   <a:bodyPr/>
                   <a:lstStyle/>
                   <a:p>
-                    <a:fld id="{21CF9FD8-9A24-484D-AEF4-441062CAB6E8}" type="CELLRANGE">
+                    <a:fld id="{6B2FEE3F-F1F3-49E4-A8BD-99A2BB56F9E2}" type="CELLRANGE">
                       <a:rPr lang="de-DE"/>
                       <a:pPr/>
                       <a:t>[ZELLBEREICH]</a:t>
@@ -588,7 +589,7 @@
                   <a:bodyPr/>
                   <a:lstStyle/>
                   <a:p>
-                    <a:fld id="{5E54DA24-513D-4FF6-9CED-9265401DB841}" type="CELLRANGE">
+                    <a:fld id="{0921B0B8-7A1D-44DF-8884-ECBDC07242D3}" type="CELLRANGE">
                       <a:rPr lang="de-DE"/>
                       <a:pPr/>
                       <a:t>[ZELLBEREICH]</a:t>
@@ -621,7 +622,7 @@
                   <a:bodyPr/>
                   <a:lstStyle/>
                   <a:p>
-                    <a:fld id="{D7324E3E-20B2-4E17-9A60-F2D97631FB7C}" type="CELLRANGE">
+                    <a:fld id="{E0759279-F1A8-4696-9B09-90B7E85C7DC4}" type="CELLRANGE">
                       <a:rPr lang="de-DE"/>
                       <a:pPr/>
                       <a:t>[ZELLBEREICH]</a:t>
@@ -654,7 +655,7 @@
                   <a:bodyPr/>
                   <a:lstStyle/>
                   <a:p>
-                    <a:fld id="{6731DAC9-DBCE-439C-866F-A9EE8E09CEA5}" type="CELLRANGE">
+                    <a:fld id="{9287ADB7-6005-4CC3-90E0-607607CD0C8D}" type="CELLRANGE">
                       <a:rPr lang="de-DE"/>
                       <a:pPr/>
                       <a:t>[ZELLBEREICH]</a:t>
@@ -1157,7 +1158,7 @@
                   <a:bodyPr/>
                   <a:lstStyle/>
                   <a:p>
-                    <a:fld id="{A175E8C0-3CEE-43FE-80CA-33B7A3865367}" type="CELLRANGE">
+                    <a:fld id="{E3744FF2-02B7-4ABC-B495-A482F6EBB665}" type="CELLRANGE">
                       <a:rPr lang="de-DE"/>
                       <a:pPr/>
                       <a:t>[ZELLBEREICH]</a:t>
@@ -1190,7 +1191,7 @@
                   <a:bodyPr/>
                   <a:lstStyle/>
                   <a:p>
-                    <a:fld id="{4ADE69F4-9F2E-435F-8628-0FEB157AB5C6}" type="CELLRANGE">
+                    <a:fld id="{298DE7A5-4492-45F2-BC80-3194D67DD7EC}" type="CELLRANGE">
                       <a:rPr lang="de-DE"/>
                       <a:pPr/>
                       <a:t>[ZELLBEREICH]</a:t>
@@ -1223,7 +1224,7 @@
                   <a:bodyPr/>
                   <a:lstStyle/>
                   <a:p>
-                    <a:fld id="{114C212C-232A-4C4C-8A2F-60542D0FFF05}" type="CELLRANGE">
+                    <a:fld id="{42C5AE86-AA7D-457A-BCF6-F26BC6EBCCC2}" type="CELLRANGE">
                       <a:rPr lang="de-DE"/>
                       <a:pPr/>
                       <a:t>[ZELLBEREICH]</a:t>
@@ -1256,7 +1257,7 @@
                   <a:bodyPr/>
                   <a:lstStyle/>
                   <a:p>
-                    <a:fld id="{6D414FEF-8A4F-4C50-85C8-AAEEE2877C62}" type="CELLRANGE">
+                    <a:fld id="{61EDD350-940B-4C43-A276-459971E865E4}" type="CELLRANGE">
                       <a:rPr lang="de-DE"/>
                       <a:pPr/>
                       <a:t>[ZELLBEREICH]</a:t>
@@ -1493,7 +1494,7 @@
                   <a:bodyPr/>
                   <a:lstStyle/>
                   <a:p>
-                    <a:fld id="{02F629EF-2CC4-4EC5-A46E-7BAC03BAAF3E}" type="CELLRANGE">
+                    <a:fld id="{DAA160D5-9413-43F4-8F64-422957526B18}" type="CELLRANGE">
                       <a:rPr lang="de-DE"/>
                       <a:pPr/>
                       <a:t>[ZELLBEREICH]</a:t>
@@ -1526,7 +1527,7 @@
                   <a:bodyPr/>
                   <a:lstStyle/>
                   <a:p>
-                    <a:fld id="{CA808BFD-D608-4BA3-ABBA-7E601357BD98}" type="CELLRANGE">
+                    <a:fld id="{0BE7C7F0-761E-4C73-8AC5-75ED8E3ABAFE}" type="CELLRANGE">
                       <a:rPr lang="de-DE"/>
                       <a:pPr/>
                       <a:t>[ZELLBEREICH]</a:t>
@@ -1559,7 +1560,7 @@
                   <a:bodyPr/>
                   <a:lstStyle/>
                   <a:p>
-                    <a:fld id="{50E417E8-D069-41F7-899D-61449652587A}" type="CELLRANGE">
+                    <a:fld id="{5C48B750-E271-4B41-A374-0F647E1FC140}" type="CELLRANGE">
                       <a:rPr lang="de-DE"/>
                       <a:pPr/>
                       <a:t>[ZELLBEREICH]</a:t>
@@ -1592,7 +1593,7 @@
                   <a:bodyPr/>
                   <a:lstStyle/>
                   <a:p>
-                    <a:fld id="{BA6ADB6F-DE6B-46D3-9DCB-EEDBA57E7277}" type="CELLRANGE">
+                    <a:fld id="{77FE1C4C-733E-4C40-AF9C-B7860F7ABDD6}" type="CELLRANGE">
                       <a:rPr lang="de-DE"/>
                       <a:pPr/>
                       <a:t>[ZELLBEREICH]</a:t>
@@ -1965,6 +1966,602 @@
 </c:chartSpace>
 </file>
 
+<file path=ppt/charts/chart3.xml><?xml version="1.0" encoding="utf-8"?>
+<c:chartSpace xmlns:c="http://schemas.openxmlformats.org/drawingml/2006/chart" xmlns:a="http://schemas.openxmlformats.org/drawingml/2006/main" xmlns:r="http://schemas.openxmlformats.org/officeDocument/2006/relationships" xmlns:c16r2="http://schemas.microsoft.com/office/drawing/2015/06/chart">
+  <c:date1904 val="0"/>
+  <c:lang val="de-DE"/>
+  <c:roundedCorners val="0"/>
+  <mc:AlternateContent xmlns:mc="http://schemas.openxmlformats.org/markup-compatibility/2006">
+    <mc:Choice xmlns:c14="http://schemas.microsoft.com/office/drawing/2007/8/2/chart" Requires="c14">
+      <c14:style val="102"/>
+    </mc:Choice>
+    <mc:Fallback>
+      <c:style val="2"/>
+    </mc:Fallback>
+  </mc:AlternateContent>
+  <c:chart>
+    <c:autoTitleDeleted val="1"/>
+    <c:plotArea>
+      <c:layout>
+        <c:manualLayout>
+          <c:layoutTarget val="inner"/>
+          <c:xMode val="edge"/>
+          <c:yMode val="edge"/>
+          <c:x val="4.542346482598069E-2"/>
+          <c:y val="3.6552416476729493E-2"/>
+          <c:w val="0.77857934400054729"/>
+          <c:h val="0.8911129106201382"/>
+        </c:manualLayout>
+      </c:layout>
+      <c:scatterChart>
+        <c:scatterStyle val="lineMarker"/>
+        <c:varyColors val="0"/>
+        <c:ser>
+          <c:idx val="1"/>
+          <c:order val="0"/>
+          <c:tx>
+            <c:strRef>
+              <c:f>Tabelle1!$B$1</c:f>
+              <c:strCache>
+                <c:ptCount val="1"/>
+                <c:pt idx="0">
+                  <c:v>Series1-X</c:v>
+                </c:pt>
+              </c:strCache>
+            </c:strRef>
+          </c:tx>
+          <c:spPr>
+            <a:ln w="25400" cap="rnd">
+              <a:noFill/>
+              <a:round/>
+            </a:ln>
+            <a:effectLst/>
+          </c:spPr>
+          <c:marker>
+            <c:symbol val="picture"/>
+            <c:spPr>
+              <a:blipFill>
+                <a:blip xmlns:r="http://schemas.openxmlformats.org/officeDocument/2006/relationships" r:embed="rId3"/>
+                <a:stretch>
+                  <a:fillRect/>
+                </a:stretch>
+              </a:blipFill>
+              <a:ln w="9525">
+                <a:solidFill>
+                  <a:schemeClr val="accent2"/>
+                </a:solidFill>
+              </a:ln>
+              <a:effectLst/>
+            </c:spPr>
+          </c:marker>
+          <c:dPt>
+            <c:idx val="0"/>
+            <c:marker>
+              <c:symbol val="picture"/>
+              <c:spPr>
+                <a:blipFill>
+                  <a:blip xmlns:r="http://schemas.openxmlformats.org/officeDocument/2006/relationships" r:embed="rId3"/>
+                  <a:stretch>
+                    <a:fillRect/>
+                  </a:stretch>
+                </a:blipFill>
+                <a:ln w="9525">
+                  <a:solidFill>
+                    <a:schemeClr val="accent2"/>
+                  </a:solidFill>
+                </a:ln>
+                <a:effectLst/>
+              </c:spPr>
+            </c:marker>
+            <c:bubble3D val="0"/>
+            <c:extLst>
+              <c:ext xmlns:c16="http://schemas.microsoft.com/office/drawing/2014/chart" uri="{C3380CC4-5D6E-409C-BE32-E72D297353CC}">
+                <c16:uniqueId val="{00000000-FE96-4B7B-86E1-8FECF11C9C1B}"/>
+              </c:ext>
+            </c:extLst>
+          </c:dPt>
+          <c:dLbls>
+            <c:dLbl>
+              <c:idx val="0"/>
+              <c:tx>
+                <c:rich>
+                  <a:bodyPr/>
+                  <a:lstStyle/>
+                  <a:p>
+                    <a:fld id="{F90715B7-F735-42D1-95A5-31DA7DF4779F}" type="CELLRANGE">
+                      <a:rPr lang="en-US"/>
+                      <a:pPr/>
+                      <a:t>[ZELLBEREICH]</a:t>
+                    </a:fld>
+                    <a:endParaRPr lang="de-DE"/>
+                  </a:p>
+                </c:rich>
+              </c:tx>
+              <c:showLegendKey val="0"/>
+              <c:showVal val="0"/>
+              <c:showCatName val="0"/>
+              <c:showSerName val="0"/>
+              <c:showPercent val="0"/>
+              <c:showBubbleSize val="0"/>
+              <c:extLst>
+                <c:ext xmlns:c15="http://schemas.microsoft.com/office/drawing/2012/chart" uri="{CE6537A1-D6FC-4f65-9D91-7224C49458BB}">
+                  <c15:dlblFieldTable/>
+                  <c15:showDataLabelsRange val="1"/>
+                </c:ext>
+                <c:ext xmlns:c16="http://schemas.microsoft.com/office/drawing/2014/chart" uri="{C3380CC4-5D6E-409C-BE32-E72D297353CC}">
+                  <c16:uniqueId val="{00000000-FE96-4B7B-86E1-8FECF11C9C1B}"/>
+                </c:ext>
+              </c:extLst>
+            </c:dLbl>
+            <c:dLbl>
+              <c:idx val="1"/>
+              <c:tx>
+                <c:rich>
+                  <a:bodyPr/>
+                  <a:lstStyle/>
+                  <a:p>
+                    <a:fld id="{4F225748-B631-48A0-ADF3-607D3889F12B}" type="CELLRANGE">
+                      <a:rPr lang="de-DE"/>
+                      <a:pPr/>
+                      <a:t>[ZELLBEREICH]</a:t>
+                    </a:fld>
+                    <a:endParaRPr lang="de-DE"/>
+                  </a:p>
+                </c:rich>
+              </c:tx>
+              <c:showLegendKey val="0"/>
+              <c:showVal val="0"/>
+              <c:showCatName val="0"/>
+              <c:showSerName val="0"/>
+              <c:showPercent val="0"/>
+              <c:showBubbleSize val="0"/>
+              <c:extLst>
+                <c:ext xmlns:c15="http://schemas.microsoft.com/office/drawing/2012/chart" uri="{CE6537A1-D6FC-4f65-9D91-7224C49458BB}">
+                  <c15:dlblFieldTable/>
+                  <c15:xForSave val="1"/>
+                  <c15:showDataLabelsRange val="1"/>
+                </c:ext>
+                <c:ext xmlns:c16="http://schemas.microsoft.com/office/drawing/2014/chart" uri="{C3380CC4-5D6E-409C-BE32-E72D297353CC}">
+                  <c16:uniqueId val="{00000001-FE96-4B7B-86E1-8FECF11C9C1B}"/>
+                </c:ext>
+              </c:extLst>
+            </c:dLbl>
+            <c:dLbl>
+              <c:idx val="2"/>
+              <c:tx>
+                <c:rich>
+                  <a:bodyPr/>
+                  <a:lstStyle/>
+                  <a:p>
+                    <a:fld id="{002879B4-F90E-4FC5-B8B2-6D57F2F6E6A1}" type="CELLRANGE">
+                      <a:rPr lang="de-DE"/>
+                      <a:pPr/>
+                      <a:t>[ZELLBEREICH]</a:t>
+                    </a:fld>
+                    <a:endParaRPr lang="de-DE"/>
+                  </a:p>
+                </c:rich>
+              </c:tx>
+              <c:showLegendKey val="0"/>
+              <c:showVal val="0"/>
+              <c:showCatName val="0"/>
+              <c:showSerName val="0"/>
+              <c:showPercent val="0"/>
+              <c:showBubbleSize val="0"/>
+              <c:extLst>
+                <c:ext xmlns:c15="http://schemas.microsoft.com/office/drawing/2012/chart" uri="{CE6537A1-D6FC-4f65-9D91-7224C49458BB}">
+                  <c15:dlblFieldTable/>
+                  <c15:xForSave val="1"/>
+                  <c15:showDataLabelsRange val="1"/>
+                </c:ext>
+                <c:ext xmlns:c16="http://schemas.microsoft.com/office/drawing/2014/chart" uri="{C3380CC4-5D6E-409C-BE32-E72D297353CC}">
+                  <c16:uniqueId val="{00000002-FE96-4B7B-86E1-8FECF11C9C1B}"/>
+                </c:ext>
+              </c:extLst>
+            </c:dLbl>
+            <c:dLbl>
+              <c:idx val="3"/>
+              <c:tx>
+                <c:rich>
+                  <a:bodyPr/>
+                  <a:lstStyle/>
+                  <a:p>
+                    <a:fld id="{6BC848D4-60A1-441E-99E2-3077C33E38D6}" type="CELLRANGE">
+                      <a:rPr lang="de-DE"/>
+                      <a:pPr/>
+                      <a:t>[ZELLBEREICH]</a:t>
+                    </a:fld>
+                    <a:endParaRPr lang="de-DE"/>
+                  </a:p>
+                </c:rich>
+              </c:tx>
+              <c:showLegendKey val="0"/>
+              <c:showVal val="0"/>
+              <c:showCatName val="0"/>
+              <c:showSerName val="0"/>
+              <c:showPercent val="0"/>
+              <c:showBubbleSize val="0"/>
+              <c:extLst>
+                <c:ext xmlns:c15="http://schemas.microsoft.com/office/drawing/2012/chart" uri="{CE6537A1-D6FC-4f65-9D91-7224C49458BB}">
+                  <c15:dlblFieldTable/>
+                  <c15:xForSave val="1"/>
+                  <c15:showDataLabelsRange val="1"/>
+                </c:ext>
+                <c:ext xmlns:c16="http://schemas.microsoft.com/office/drawing/2014/chart" uri="{C3380CC4-5D6E-409C-BE32-E72D297353CC}">
+                  <c16:uniqueId val="{00000003-FE96-4B7B-86E1-8FECF11C9C1B}"/>
+                </c:ext>
+              </c:extLst>
+            </c:dLbl>
+            <c:dLbl>
+              <c:idx val="4"/>
+              <c:tx>
+                <c:rich>
+                  <a:bodyPr/>
+                  <a:lstStyle/>
+                  <a:p>
+                    <a:fld id="{983DC7C5-5266-4051-8499-2E447F03DC78}" type="CELLRANGE">
+                      <a:rPr lang="de-DE"/>
+                      <a:pPr/>
+                      <a:t>[ZELLBEREICH]</a:t>
+                    </a:fld>
+                    <a:endParaRPr lang="de-DE"/>
+                  </a:p>
+                </c:rich>
+              </c:tx>
+              <c:showLegendKey val="0"/>
+              <c:showVal val="0"/>
+              <c:showCatName val="0"/>
+              <c:showSerName val="0"/>
+              <c:showPercent val="0"/>
+              <c:showBubbleSize val="0"/>
+              <c:extLst>
+                <c:ext xmlns:c15="http://schemas.microsoft.com/office/drawing/2012/chart" uri="{CE6537A1-D6FC-4f65-9D91-7224C49458BB}">
+                  <c15:dlblFieldTable/>
+                  <c15:xForSave val="1"/>
+                  <c15:showDataLabelsRange val="1"/>
+                </c:ext>
+                <c:ext xmlns:c16="http://schemas.microsoft.com/office/drawing/2014/chart" uri="{C3380CC4-5D6E-409C-BE32-E72D297353CC}">
+                  <c16:uniqueId val="{00000004-FE96-4B7B-86E1-8FECF11C9C1B}"/>
+                </c:ext>
+              </c:extLst>
+            </c:dLbl>
+            <c:spPr>
+              <a:noFill/>
+              <a:ln>
+                <a:noFill/>
+              </a:ln>
+              <a:effectLst/>
+            </c:spPr>
+            <c:txPr>
+              <a:bodyPr rot="0" spcFirstLastPara="1" vertOverflow="ellipsis" vert="horz" wrap="square" lIns="38100" tIns="19050" rIns="38100" bIns="19050" anchor="ctr" anchorCtr="1">
+                <a:spAutoFit/>
+              </a:bodyPr>
+              <a:lstStyle/>
+              <a:p>
+                <a:pPr>
+                  <a:defRPr sz="1197" b="0" i="0" u="none" strike="noStrike" kern="1200" baseline="0">
+                    <a:solidFill>
+                      <a:schemeClr val="tx1">
+                        <a:lumMod val="75000"/>
+                        <a:lumOff val="25000"/>
+                      </a:schemeClr>
+                    </a:solidFill>
+                    <a:latin typeface="+mn-lt"/>
+                    <a:ea typeface="+mn-ea"/>
+                    <a:cs typeface="+mn-cs"/>
+                  </a:defRPr>
+                </a:pPr>
+                <a:endParaRPr lang="de-DE"/>
+              </a:p>
+            </c:txPr>
+            <c:showLegendKey val="0"/>
+            <c:showVal val="0"/>
+            <c:showCatName val="0"/>
+            <c:showSerName val="0"/>
+            <c:showPercent val="0"/>
+            <c:showBubbleSize val="0"/>
+            <c:showLeaderLines val="0"/>
+            <c:extLst>
+              <c:ext xmlns:c15="http://schemas.microsoft.com/office/drawing/2012/chart" uri="{CE6537A1-D6FC-4f65-9D91-7224C49458BB}">
+                <c15:showDataLabelsRange val="1"/>
+                <c15:showLeaderLines val="1"/>
+                <c15:leaderLines>
+                  <c:spPr>
+                    <a:ln w="9525" cap="flat" cmpd="sng" algn="ctr">
+                      <a:solidFill>
+                        <a:schemeClr val="tx1">
+                          <a:lumMod val="35000"/>
+                          <a:lumOff val="65000"/>
+                        </a:schemeClr>
+                      </a:solidFill>
+                      <a:round/>
+                    </a:ln>
+                    <a:effectLst/>
+                  </c:spPr>
+                </c15:leaderLines>
+              </c:ext>
+            </c:extLst>
+          </c:dLbls>
+          <c:xVal>
+            <c:numRef>
+              <c:f>Tabelle1!$B$2:$B$6</c:f>
+              <c:numCache>
+                <c:formatCode>General</c:formatCode>
+                <c:ptCount val="5"/>
+                <c:pt idx="0">
+                  <c:v>5</c:v>
+                </c:pt>
+                <c:pt idx="1">
+                  <c:v>12</c:v>
+                </c:pt>
+                <c:pt idx="2">
+                  <c:v>15</c:v>
+                </c:pt>
+                <c:pt idx="3">
+                  <c:v>6</c:v>
+                </c:pt>
+                <c:pt idx="4">
+                  <c:v>5</c:v>
+                </c:pt>
+              </c:numCache>
+            </c:numRef>
+          </c:xVal>
+          <c:yVal>
+            <c:numRef>
+              <c:f>Tabelle1!$C$2:$C$6</c:f>
+              <c:numCache>
+                <c:formatCode>General</c:formatCode>
+                <c:ptCount val="5"/>
+                <c:pt idx="0">
+                  <c:v>3</c:v>
+                </c:pt>
+                <c:pt idx="1">
+                  <c:v>3</c:v>
+                </c:pt>
+                <c:pt idx="2">
+                  <c:v>10</c:v>
+                </c:pt>
+                <c:pt idx="3">
+                  <c:v>8</c:v>
+                </c:pt>
+                <c:pt idx="4">
+                  <c:v>15</c:v>
+                </c:pt>
+              </c:numCache>
+            </c:numRef>
+          </c:yVal>
+          <c:smooth val="0"/>
+          <c:extLst>
+            <c:ext xmlns:c15="http://schemas.microsoft.com/office/drawing/2012/chart" uri="{02D57815-91ED-43cb-92C2-25804820EDAC}">
+              <c15:datalabelsRange>
+                <c15:f>Tabelle1!$A$2:$A$6</c15:f>
+                <c15:dlblRangeCache>
+                  <c:ptCount val="5"/>
+                  <c:pt idx="0">
+                    <c:v>Item 1</c:v>
+                  </c:pt>
+                  <c:pt idx="1">
+                    <c:v>Item 2</c:v>
+                  </c:pt>
+                  <c:pt idx="2">
+                    <c:v>Item 3</c:v>
+                  </c:pt>
+                  <c:pt idx="3">
+                    <c:v>Item 4</c:v>
+                  </c:pt>
+                  <c:pt idx="4">
+                    <c:v>Item 5</c:v>
+                  </c:pt>
+                </c15:dlblRangeCache>
+              </c15:datalabelsRange>
+            </c:ext>
+            <c:ext xmlns:c16="http://schemas.microsoft.com/office/drawing/2014/chart" uri="{C3380CC4-5D6E-409C-BE32-E72D297353CC}">
+              <c16:uniqueId val="{00000001-5E61-426B-A026-4AA584F30620}"/>
+            </c:ext>
+          </c:extLst>
+        </c:ser>
+        <c:dLbls>
+          <c:showLegendKey val="0"/>
+          <c:showVal val="0"/>
+          <c:showCatName val="0"/>
+          <c:showSerName val="0"/>
+          <c:showPercent val="0"/>
+          <c:showBubbleSize val="0"/>
+        </c:dLbls>
+        <c:axId val="1957917232"/>
+        <c:axId val="2126909104"/>
+      </c:scatterChart>
+      <c:valAx>
+        <c:axId val="1957917232"/>
+        <c:scaling>
+          <c:orientation val="minMax"/>
+        </c:scaling>
+        <c:delete val="0"/>
+        <c:axPos val="b"/>
+        <c:majorGridlines>
+          <c:spPr>
+            <a:ln w="9525" cap="flat" cmpd="sng" algn="ctr">
+              <a:solidFill>
+                <a:schemeClr val="tx1">
+                  <a:lumMod val="15000"/>
+                  <a:lumOff val="85000"/>
+                </a:schemeClr>
+              </a:solidFill>
+              <a:round/>
+            </a:ln>
+            <a:effectLst/>
+          </c:spPr>
+        </c:majorGridlines>
+        <c:numFmt formatCode="General" sourceLinked="1"/>
+        <c:majorTickMark val="out"/>
+        <c:minorTickMark val="none"/>
+        <c:tickLblPos val="nextTo"/>
+        <c:spPr>
+          <a:noFill/>
+          <a:ln w="9525" cap="flat" cmpd="sng" algn="ctr">
+            <a:solidFill>
+              <a:schemeClr val="tx1">
+                <a:lumMod val="15000"/>
+                <a:lumOff val="85000"/>
+              </a:schemeClr>
+            </a:solidFill>
+            <a:round/>
+          </a:ln>
+          <a:effectLst/>
+        </c:spPr>
+        <c:txPr>
+          <a:bodyPr rot="-60000000" spcFirstLastPara="1" vertOverflow="ellipsis" vert="horz" wrap="square" anchor="ctr" anchorCtr="1"/>
+          <a:lstStyle/>
+          <a:p>
+            <a:pPr>
+              <a:defRPr sz="1197" b="0" i="0" u="none" strike="noStrike" kern="1200" baseline="0">
+                <a:solidFill>
+                  <a:schemeClr val="tx1">
+                    <a:lumMod val="65000"/>
+                    <a:lumOff val="35000"/>
+                  </a:schemeClr>
+                </a:solidFill>
+                <a:latin typeface="+mn-lt"/>
+                <a:ea typeface="+mn-ea"/>
+                <a:cs typeface="+mn-cs"/>
+              </a:defRPr>
+            </a:pPr>
+            <a:endParaRPr lang="de-DE"/>
+          </a:p>
+        </c:txPr>
+        <c:crossAx val="2126909104"/>
+        <c:crosses val="autoZero"/>
+        <c:crossBetween val="midCat"/>
+      </c:valAx>
+      <c:valAx>
+        <c:axId val="2126909104"/>
+        <c:scaling>
+          <c:orientation val="minMax"/>
+        </c:scaling>
+        <c:delete val="0"/>
+        <c:axPos val="l"/>
+        <c:majorGridlines>
+          <c:spPr>
+            <a:ln w="9525" cap="flat" cmpd="sng" algn="ctr">
+              <a:solidFill>
+                <a:schemeClr val="tx1">
+                  <a:lumMod val="15000"/>
+                  <a:lumOff val="85000"/>
+                </a:schemeClr>
+              </a:solidFill>
+              <a:round/>
+            </a:ln>
+            <a:effectLst/>
+          </c:spPr>
+        </c:majorGridlines>
+        <c:numFmt formatCode="General" sourceLinked="1"/>
+        <c:majorTickMark val="out"/>
+        <c:minorTickMark val="none"/>
+        <c:tickLblPos val="nextTo"/>
+        <c:spPr>
+          <a:noFill/>
+          <a:ln>
+            <a:noFill/>
+          </a:ln>
+          <a:effectLst/>
+        </c:spPr>
+        <c:txPr>
+          <a:bodyPr rot="-60000000" spcFirstLastPara="1" vertOverflow="ellipsis" vert="horz" wrap="square" anchor="ctr" anchorCtr="1"/>
+          <a:lstStyle/>
+          <a:p>
+            <a:pPr>
+              <a:defRPr sz="1197" b="0" i="0" u="none" strike="noStrike" kern="1200" baseline="0">
+                <a:solidFill>
+                  <a:schemeClr val="tx1">
+                    <a:lumMod val="65000"/>
+                    <a:lumOff val="35000"/>
+                  </a:schemeClr>
+                </a:solidFill>
+                <a:latin typeface="+mn-lt"/>
+                <a:ea typeface="+mn-ea"/>
+                <a:cs typeface="+mn-cs"/>
+              </a:defRPr>
+            </a:pPr>
+            <a:endParaRPr lang="de-DE"/>
+          </a:p>
+        </c:txPr>
+        <c:crossAx val="1957917232"/>
+        <c:crosses val="autoZero"/>
+        <c:crossBetween val="midCat"/>
+      </c:valAx>
+      <c:spPr>
+        <a:noFill/>
+        <a:ln>
+          <a:noFill/>
+        </a:ln>
+        <a:effectLst/>
+      </c:spPr>
+    </c:plotArea>
+    <c:legend>
+      <c:legendPos val="r"/>
+      <c:overlay val="0"/>
+      <c:spPr>
+        <a:noFill/>
+        <a:ln>
+          <a:noFill/>
+        </a:ln>
+        <a:effectLst/>
+      </c:spPr>
+      <c:txPr>
+        <a:bodyPr rot="0" spcFirstLastPara="1" vertOverflow="ellipsis" vert="horz" wrap="square" anchor="ctr" anchorCtr="1"/>
+        <a:lstStyle/>
+        <a:p>
+          <a:pPr>
+            <a:defRPr sz="1197" b="0" i="0" u="none" strike="noStrike" kern="1200" baseline="0">
+              <a:solidFill>
+                <a:schemeClr val="tx1">
+                  <a:lumMod val="65000"/>
+                  <a:lumOff val="35000"/>
+                </a:schemeClr>
+              </a:solidFill>
+              <a:latin typeface="+mn-lt"/>
+              <a:ea typeface="+mn-ea"/>
+              <a:cs typeface="+mn-cs"/>
+            </a:defRPr>
+          </a:pPr>
+          <a:endParaRPr lang="de-DE"/>
+        </a:p>
+      </c:txPr>
+    </c:legend>
+    <c:plotVisOnly val="1"/>
+    <c:dispBlanksAs val="gap"/>
+    <c:extLst>
+      <c:ext xmlns:c16r3="http://schemas.microsoft.com/office/drawing/2017/03/chart" uri="{56B9EC1D-385E-4148-901F-78D8002777C0}">
+        <c16r3:dataDisplayOptions16>
+          <c16r3:dispNaAsBlank val="1"/>
+        </c16r3:dataDisplayOptions16>
+      </c:ext>
+    </c:extLst>
+    <c:showDLblsOverMax val="0"/>
+  </c:chart>
+  <c:spPr>
+    <a:noFill/>
+    <a:ln>
+      <a:noFill/>
+    </a:ln>
+    <a:effectLst/>
+  </c:spPr>
+  <c:txPr>
+    <a:bodyPr/>
+    <a:lstStyle/>
+    <a:p>
+      <a:pPr>
+        <a:defRPr/>
+      </a:pPr>
+      <a:endParaRPr lang="de-DE"/>
+    </a:p>
+  </c:txPr>
+  <c:externalData r:id="rId4">
+    <c:autoUpdate val="0"/>
+  </c:externalData>
+</c:chartSpace>
+</file>
+
 <file path=ppt/charts/colors1.xml><?xml version="1.0" encoding="utf-8"?>
 <cs:colorStyle xmlns:cs="http://schemas.microsoft.com/office/drawing/2012/chartStyle" xmlns:a="http://schemas.openxmlformats.org/drawingml/2006/main" meth="cycle" id="10">
   <a:schemeClr val="accent1"/>
@@ -2045,6 +2642,46 @@
 </cs:colorStyle>
 </file>
 
+<file path=ppt/charts/colors3.xml><?xml version="1.0" encoding="utf-8"?>
+<cs:colorStyle xmlns:cs="http://schemas.microsoft.com/office/drawing/2012/chartStyle" xmlns:a="http://schemas.openxmlformats.org/drawingml/2006/main" meth="cycle" id="10">
+  <a:schemeClr val="accent1"/>
+  <a:schemeClr val="accent2"/>
+  <a:schemeClr val="accent3"/>
+  <a:schemeClr val="accent4"/>
+  <a:schemeClr val="accent5"/>
+  <a:schemeClr val="accent6"/>
+  <cs:variation/>
+  <cs:variation>
+    <a:lumMod val="60000"/>
+  </cs:variation>
+  <cs:variation>
+    <a:lumMod val="80000"/>
+    <a:lumOff val="20000"/>
+  </cs:variation>
+  <cs:variation>
+    <a:lumMod val="80000"/>
+  </cs:variation>
+  <cs:variation>
+    <a:lumMod val="60000"/>
+    <a:lumOff val="40000"/>
+  </cs:variation>
+  <cs:variation>
+    <a:lumMod val="50000"/>
+  </cs:variation>
+  <cs:variation>
+    <a:lumMod val="70000"/>
+    <a:lumOff val="30000"/>
+  </cs:variation>
+  <cs:variation>
+    <a:lumMod val="70000"/>
+  </cs:variation>
+  <cs:variation>
+    <a:lumMod val="50000"/>
+    <a:lumOff val="50000"/>
+  </cs:variation>
+</cs:colorStyle>
+</file>
+
 <file path=ppt/charts/style1.xml><?xml version="1.0" encoding="utf-8"?>
 <cs:chartStyle xmlns:cs="http://schemas.microsoft.com/office/drawing/2012/chartStyle" xmlns:a="http://schemas.openxmlformats.org/drawingml/2006/main" id="201">
   <cs:axisTitle>
@@ -2549,6 +3186,509 @@
 </file>
 
 <file path=ppt/charts/style2.xml><?xml version="1.0" encoding="utf-8"?>
+<cs:chartStyle xmlns:cs="http://schemas.microsoft.com/office/drawing/2012/chartStyle" xmlns:a="http://schemas.openxmlformats.org/drawingml/2006/main" id="201">
+  <cs:axisTitle>
+    <cs:lnRef idx="0"/>
+    <cs:fillRef idx="0"/>
+    <cs:effectRef idx="0"/>
+    <cs:fontRef idx="minor">
+      <a:schemeClr val="tx1">
+        <a:lumMod val="65000"/>
+        <a:lumOff val="35000"/>
+      </a:schemeClr>
+    </cs:fontRef>
+    <cs:defRPr sz="1330" kern="1200"/>
+  </cs:axisTitle>
+  <cs:categoryAxis>
+    <cs:lnRef idx="0"/>
+    <cs:fillRef idx="0"/>
+    <cs:effectRef idx="0"/>
+    <cs:fontRef idx="minor">
+      <a:schemeClr val="tx1">
+        <a:lumMod val="65000"/>
+        <a:lumOff val="35000"/>
+      </a:schemeClr>
+    </cs:fontRef>
+    <cs:spPr>
+      <a:ln w="9525" cap="flat" cmpd="sng" algn="ctr">
+        <a:solidFill>
+          <a:schemeClr val="tx1">
+            <a:lumMod val="15000"/>
+            <a:lumOff val="85000"/>
+          </a:schemeClr>
+        </a:solidFill>
+        <a:round/>
+      </a:ln>
+    </cs:spPr>
+    <cs:defRPr sz="1197" kern="1200"/>
+  </cs:categoryAxis>
+  <cs:chartArea mods="allowNoFillOverride allowNoLineOverride">
+    <cs:lnRef idx="0"/>
+    <cs:fillRef idx="0"/>
+    <cs:effectRef idx="0"/>
+    <cs:fontRef idx="minor">
+      <a:schemeClr val="tx1"/>
+    </cs:fontRef>
+    <cs:spPr>
+      <a:solidFill>
+        <a:schemeClr val="bg1"/>
+      </a:solidFill>
+      <a:ln w="9525" cap="flat" cmpd="sng" algn="ctr">
+        <a:solidFill>
+          <a:schemeClr val="tx1">
+            <a:lumMod val="15000"/>
+            <a:lumOff val="85000"/>
+          </a:schemeClr>
+        </a:solidFill>
+        <a:round/>
+      </a:ln>
+    </cs:spPr>
+    <cs:defRPr sz="1330" kern="1200"/>
+  </cs:chartArea>
+  <cs:dataLabel>
+    <cs:lnRef idx="0"/>
+    <cs:fillRef idx="0"/>
+    <cs:effectRef idx="0"/>
+    <cs:fontRef idx="minor">
+      <a:schemeClr val="tx1">
+        <a:lumMod val="75000"/>
+        <a:lumOff val="25000"/>
+      </a:schemeClr>
+    </cs:fontRef>
+    <cs:defRPr sz="1197" kern="1200"/>
+  </cs:dataLabel>
+  <cs:dataLabelCallout>
+    <cs:lnRef idx="0"/>
+    <cs:fillRef idx="0"/>
+    <cs:effectRef idx="0"/>
+    <cs:fontRef idx="minor">
+      <a:schemeClr val="dk1">
+        <a:lumMod val="65000"/>
+        <a:lumOff val="35000"/>
+      </a:schemeClr>
+    </cs:fontRef>
+    <cs:spPr>
+      <a:solidFill>
+        <a:schemeClr val="lt1"/>
+      </a:solidFill>
+      <a:ln>
+        <a:solidFill>
+          <a:schemeClr val="dk1">
+            <a:lumMod val="25000"/>
+            <a:lumOff val="75000"/>
+          </a:schemeClr>
+        </a:solidFill>
+      </a:ln>
+    </cs:spPr>
+    <cs:defRPr sz="1197" kern="1200"/>
+    <cs:bodyPr rot="0" spcFirstLastPara="1" vertOverflow="clip" horzOverflow="clip" vert="horz" wrap="square" lIns="36576" tIns="18288" rIns="36576" bIns="18288" anchor="ctr" anchorCtr="1">
+      <a:spAutoFit/>
+    </cs:bodyPr>
+  </cs:dataLabelCallout>
+  <cs:dataPoint>
+    <cs:lnRef idx="0"/>
+    <cs:fillRef idx="1">
+      <cs:styleClr val="auto"/>
+    </cs:fillRef>
+    <cs:effectRef idx="0"/>
+    <cs:fontRef idx="minor">
+      <a:schemeClr val="tx1"/>
+    </cs:fontRef>
+  </cs:dataPoint>
+  <cs:dataPoint3D>
+    <cs:lnRef idx="0"/>
+    <cs:fillRef idx="1">
+      <cs:styleClr val="auto"/>
+    </cs:fillRef>
+    <cs:effectRef idx="0"/>
+    <cs:fontRef idx="minor">
+      <a:schemeClr val="tx1"/>
+    </cs:fontRef>
+  </cs:dataPoint3D>
+  <cs:dataPointLine>
+    <cs:lnRef idx="0">
+      <cs:styleClr val="auto"/>
+    </cs:lnRef>
+    <cs:fillRef idx="1"/>
+    <cs:effectRef idx="0"/>
+    <cs:fontRef idx="minor">
+      <a:schemeClr val="tx1"/>
+    </cs:fontRef>
+    <cs:spPr>
+      <a:ln w="28575" cap="rnd">
+        <a:solidFill>
+          <a:schemeClr val="phClr"/>
+        </a:solidFill>
+        <a:round/>
+      </a:ln>
+    </cs:spPr>
+  </cs:dataPointLine>
+  <cs:dataPointMarker>
+    <cs:lnRef idx="0">
+      <cs:styleClr val="auto"/>
+    </cs:lnRef>
+    <cs:fillRef idx="1">
+      <cs:styleClr val="auto"/>
+    </cs:fillRef>
+    <cs:effectRef idx="0"/>
+    <cs:fontRef idx="minor">
+      <a:schemeClr val="tx1"/>
+    </cs:fontRef>
+    <cs:spPr>
+      <a:ln w="9525">
+        <a:solidFill>
+          <a:schemeClr val="phClr"/>
+        </a:solidFill>
+      </a:ln>
+    </cs:spPr>
+  </cs:dataPointMarker>
+  <cs:dataPointMarkerLayout symbol="circle" size="5"/>
+  <cs:dataPointWireframe>
+    <cs:lnRef idx="0">
+      <cs:styleClr val="auto"/>
+    </cs:lnRef>
+    <cs:fillRef idx="1"/>
+    <cs:effectRef idx="0"/>
+    <cs:fontRef idx="minor">
+      <a:schemeClr val="tx1"/>
+    </cs:fontRef>
+    <cs:spPr>
+      <a:ln w="9525" cap="rnd">
+        <a:solidFill>
+          <a:schemeClr val="phClr"/>
+        </a:solidFill>
+        <a:round/>
+      </a:ln>
+    </cs:spPr>
+  </cs:dataPointWireframe>
+  <cs:dataTable>
+    <cs:lnRef idx="0"/>
+    <cs:fillRef idx="0"/>
+    <cs:effectRef idx="0"/>
+    <cs:fontRef idx="minor">
+      <a:schemeClr val="tx1">
+        <a:lumMod val="65000"/>
+        <a:lumOff val="35000"/>
+      </a:schemeClr>
+    </cs:fontRef>
+    <cs:spPr>
+      <a:noFill/>
+      <a:ln w="9525" cap="flat" cmpd="sng" algn="ctr">
+        <a:solidFill>
+          <a:schemeClr val="tx1">
+            <a:lumMod val="15000"/>
+            <a:lumOff val="85000"/>
+          </a:schemeClr>
+        </a:solidFill>
+        <a:round/>
+      </a:ln>
+    </cs:spPr>
+    <cs:defRPr sz="1197" kern="1200"/>
+  </cs:dataTable>
+  <cs:downBar>
+    <cs:lnRef idx="0"/>
+    <cs:fillRef idx="0"/>
+    <cs:effectRef idx="0"/>
+    <cs:fontRef idx="minor">
+      <a:schemeClr val="dk1"/>
+    </cs:fontRef>
+    <cs:spPr>
+      <a:solidFill>
+        <a:schemeClr val="dk1">
+          <a:lumMod val="65000"/>
+          <a:lumOff val="35000"/>
+        </a:schemeClr>
+      </a:solidFill>
+      <a:ln w="9525">
+        <a:solidFill>
+          <a:schemeClr val="tx1">
+            <a:lumMod val="65000"/>
+            <a:lumOff val="35000"/>
+          </a:schemeClr>
+        </a:solidFill>
+      </a:ln>
+    </cs:spPr>
+  </cs:downBar>
+  <cs:dropLine>
+    <cs:lnRef idx="0"/>
+    <cs:fillRef idx="0"/>
+    <cs:effectRef idx="0"/>
+    <cs:fontRef idx="minor">
+      <a:schemeClr val="tx1"/>
+    </cs:fontRef>
+    <cs:spPr>
+      <a:ln w="9525" cap="flat" cmpd="sng" algn="ctr">
+        <a:solidFill>
+          <a:schemeClr val="tx1">
+            <a:lumMod val="35000"/>
+            <a:lumOff val="65000"/>
+          </a:schemeClr>
+        </a:solidFill>
+        <a:round/>
+      </a:ln>
+    </cs:spPr>
+  </cs:dropLine>
+  <cs:errorBar>
+    <cs:lnRef idx="0"/>
+    <cs:fillRef idx="0"/>
+    <cs:effectRef idx="0"/>
+    <cs:fontRef idx="minor">
+      <a:schemeClr val="tx1"/>
+    </cs:fontRef>
+    <cs:spPr>
+      <a:ln w="9525" cap="flat" cmpd="sng" algn="ctr">
+        <a:solidFill>
+          <a:schemeClr val="tx1">
+            <a:lumMod val="65000"/>
+            <a:lumOff val="35000"/>
+          </a:schemeClr>
+        </a:solidFill>
+        <a:round/>
+      </a:ln>
+    </cs:spPr>
+  </cs:errorBar>
+  <cs:floor>
+    <cs:lnRef idx="0"/>
+    <cs:fillRef idx="0"/>
+    <cs:effectRef idx="0"/>
+    <cs:fontRef idx="minor">
+      <a:schemeClr val="tx1"/>
+    </cs:fontRef>
+    <cs:spPr>
+      <a:noFill/>
+      <a:ln>
+        <a:noFill/>
+      </a:ln>
+    </cs:spPr>
+  </cs:floor>
+  <cs:gridlineMajor>
+    <cs:lnRef idx="0"/>
+    <cs:fillRef idx="0"/>
+    <cs:effectRef idx="0"/>
+    <cs:fontRef idx="minor">
+      <a:schemeClr val="tx1"/>
+    </cs:fontRef>
+    <cs:spPr>
+      <a:ln w="9525" cap="flat" cmpd="sng" algn="ctr">
+        <a:solidFill>
+          <a:schemeClr val="tx1">
+            <a:lumMod val="15000"/>
+            <a:lumOff val="85000"/>
+          </a:schemeClr>
+        </a:solidFill>
+        <a:round/>
+      </a:ln>
+    </cs:spPr>
+  </cs:gridlineMajor>
+  <cs:gridlineMinor>
+    <cs:lnRef idx="0"/>
+    <cs:fillRef idx="0"/>
+    <cs:effectRef idx="0"/>
+    <cs:fontRef idx="minor">
+      <a:schemeClr val="tx1"/>
+    </cs:fontRef>
+    <cs:spPr>
+      <a:ln w="9525" cap="flat" cmpd="sng" algn="ctr">
+        <a:solidFill>
+          <a:schemeClr val="tx1">
+            <a:lumMod val="5000"/>
+            <a:lumOff val="95000"/>
+          </a:schemeClr>
+        </a:solidFill>
+        <a:round/>
+      </a:ln>
+    </cs:spPr>
+  </cs:gridlineMinor>
+  <cs:hiLoLine>
+    <cs:lnRef idx="0"/>
+    <cs:fillRef idx="0"/>
+    <cs:effectRef idx="0"/>
+    <cs:fontRef idx="minor">
+      <a:schemeClr val="tx1"/>
+    </cs:fontRef>
+    <cs:spPr>
+      <a:ln w="9525" cap="flat" cmpd="sng" algn="ctr">
+        <a:solidFill>
+          <a:schemeClr val="tx1">
+            <a:lumMod val="75000"/>
+            <a:lumOff val="25000"/>
+          </a:schemeClr>
+        </a:solidFill>
+        <a:round/>
+      </a:ln>
+    </cs:spPr>
+  </cs:hiLoLine>
+  <cs:leaderLine>
+    <cs:lnRef idx="0"/>
+    <cs:fillRef idx="0"/>
+    <cs:effectRef idx="0"/>
+    <cs:fontRef idx="minor">
+      <a:schemeClr val="tx1"/>
+    </cs:fontRef>
+    <cs:spPr>
+      <a:ln w="9525" cap="flat" cmpd="sng" algn="ctr">
+        <a:solidFill>
+          <a:schemeClr val="tx1">
+            <a:lumMod val="35000"/>
+            <a:lumOff val="65000"/>
+          </a:schemeClr>
+        </a:solidFill>
+        <a:round/>
+      </a:ln>
+    </cs:spPr>
+  </cs:leaderLine>
+  <cs:legend>
+    <cs:lnRef idx="0"/>
+    <cs:fillRef idx="0"/>
+    <cs:effectRef idx="0"/>
+    <cs:fontRef idx="minor">
+      <a:schemeClr val="tx1">
+        <a:lumMod val="65000"/>
+        <a:lumOff val="35000"/>
+      </a:schemeClr>
+    </cs:fontRef>
+    <cs:defRPr sz="1197" kern="1200"/>
+  </cs:legend>
+  <cs:plotArea mods="allowNoFillOverride allowNoLineOverride">
+    <cs:lnRef idx="0"/>
+    <cs:fillRef idx="0"/>
+    <cs:effectRef idx="0"/>
+    <cs:fontRef idx="minor">
+      <a:schemeClr val="tx1"/>
+    </cs:fontRef>
+  </cs:plotArea>
+  <cs:plotArea3D mods="allowNoFillOverride allowNoLineOverride">
+    <cs:lnRef idx="0"/>
+    <cs:fillRef idx="0"/>
+    <cs:effectRef idx="0"/>
+    <cs:fontRef idx="minor">
+      <a:schemeClr val="tx1"/>
+    </cs:fontRef>
+  </cs:plotArea3D>
+  <cs:seriesAxis>
+    <cs:lnRef idx="0"/>
+    <cs:fillRef idx="0"/>
+    <cs:effectRef idx="0"/>
+    <cs:fontRef idx="minor">
+      <a:schemeClr val="tx1">
+        <a:lumMod val="65000"/>
+        <a:lumOff val="35000"/>
+      </a:schemeClr>
+    </cs:fontRef>
+    <cs:defRPr sz="1197" kern="1200"/>
+  </cs:seriesAxis>
+  <cs:seriesLine>
+    <cs:lnRef idx="0"/>
+    <cs:fillRef idx="0"/>
+    <cs:effectRef idx="0"/>
+    <cs:fontRef idx="minor">
+      <a:schemeClr val="tx1"/>
+    </cs:fontRef>
+    <cs:spPr>
+      <a:ln w="9525" cap="flat" cmpd="sng" algn="ctr">
+        <a:solidFill>
+          <a:schemeClr val="tx1">
+            <a:lumMod val="35000"/>
+            <a:lumOff val="65000"/>
+          </a:schemeClr>
+        </a:solidFill>
+        <a:round/>
+      </a:ln>
+    </cs:spPr>
+  </cs:seriesLine>
+  <cs:title>
+    <cs:lnRef idx="0"/>
+    <cs:fillRef idx="0"/>
+    <cs:effectRef idx="0"/>
+    <cs:fontRef idx="minor">
+      <a:schemeClr val="tx1">
+        <a:lumMod val="65000"/>
+        <a:lumOff val="35000"/>
+      </a:schemeClr>
+    </cs:fontRef>
+    <cs:defRPr sz="1862" b="0" kern="1200" spc="0" baseline="0"/>
+  </cs:title>
+  <cs:trendline>
+    <cs:lnRef idx="0">
+      <cs:styleClr val="auto"/>
+    </cs:lnRef>
+    <cs:fillRef idx="0"/>
+    <cs:effectRef idx="0"/>
+    <cs:fontRef idx="minor">
+      <a:schemeClr val="tx1"/>
+    </cs:fontRef>
+    <cs:spPr>
+      <a:ln w="19050" cap="rnd">
+        <a:solidFill>
+          <a:schemeClr val="phClr"/>
+        </a:solidFill>
+        <a:prstDash val="sysDot"/>
+      </a:ln>
+    </cs:spPr>
+  </cs:trendline>
+  <cs:trendlineLabel>
+    <cs:lnRef idx="0"/>
+    <cs:fillRef idx="0"/>
+    <cs:effectRef idx="0"/>
+    <cs:fontRef idx="minor">
+      <a:schemeClr val="tx1">
+        <a:lumMod val="65000"/>
+        <a:lumOff val="35000"/>
+      </a:schemeClr>
+    </cs:fontRef>
+    <cs:defRPr sz="1197" kern="1200"/>
+  </cs:trendlineLabel>
+  <cs:upBar>
+    <cs:lnRef idx="0"/>
+    <cs:fillRef idx="0"/>
+    <cs:effectRef idx="0"/>
+    <cs:fontRef idx="minor">
+      <a:schemeClr val="dk1"/>
+    </cs:fontRef>
+    <cs:spPr>
+      <a:solidFill>
+        <a:schemeClr val="lt1"/>
+      </a:solidFill>
+      <a:ln w="9525">
+        <a:solidFill>
+          <a:schemeClr val="tx1">
+            <a:lumMod val="15000"/>
+            <a:lumOff val="85000"/>
+          </a:schemeClr>
+        </a:solidFill>
+      </a:ln>
+    </cs:spPr>
+  </cs:upBar>
+  <cs:valueAxis>
+    <cs:lnRef idx="0"/>
+    <cs:fillRef idx="0"/>
+    <cs:effectRef idx="0"/>
+    <cs:fontRef idx="minor">
+      <a:schemeClr val="tx1">
+        <a:lumMod val="65000"/>
+        <a:lumOff val="35000"/>
+      </a:schemeClr>
+    </cs:fontRef>
+    <cs:defRPr sz="1197" kern="1200"/>
+  </cs:valueAxis>
+  <cs:wall>
+    <cs:lnRef idx="0"/>
+    <cs:fillRef idx="0"/>
+    <cs:effectRef idx="0"/>
+    <cs:fontRef idx="minor">
+      <a:schemeClr val="tx1"/>
+    </cs:fontRef>
+    <cs:spPr>
+      <a:noFill/>
+      <a:ln>
+        <a:noFill/>
+      </a:ln>
+    </cs:spPr>
+  </cs:wall>
+</cs:chartStyle>
+</file>
+
+<file path=ppt/charts/style3.xml><?xml version="1.0" encoding="utf-8"?>
 <cs:chartStyle xmlns:cs="http://schemas.microsoft.com/office/drawing/2012/chartStyle" xmlns:a="http://schemas.openxmlformats.org/drawingml/2006/main" id="201">
   <cs:axisTitle>
     <cs:lnRef idx="0"/>
@@ -3198,7 +4338,7 @@
           <a:p>
             <a:fld id="{8FB60A0F-5ED1-45ED-A5D5-DB038E6B70D9}" type="datetimeFigureOut">
               <a:rPr lang="de-DE" smtClean="0"/>
-              <a:t>07.01.2022</a:t>
+              <a:t>12.01.2023</a:t>
             </a:fld>
             <a:endParaRPr lang="de-DE"/>
           </a:p>
@@ -3396,7 +4536,7 @@
           <a:p>
             <a:fld id="{8FB60A0F-5ED1-45ED-A5D5-DB038E6B70D9}" type="datetimeFigureOut">
               <a:rPr lang="de-DE" smtClean="0"/>
-              <a:t>07.01.2022</a:t>
+              <a:t>12.01.2023</a:t>
             </a:fld>
             <a:endParaRPr lang="de-DE"/>
           </a:p>
@@ -3604,7 +4744,7 @@
           <a:p>
             <a:fld id="{8FB60A0F-5ED1-45ED-A5D5-DB038E6B70D9}" type="datetimeFigureOut">
               <a:rPr lang="de-DE" smtClean="0"/>
-              <a:t>07.01.2022</a:t>
+              <a:t>12.01.2023</a:t>
             </a:fld>
             <a:endParaRPr lang="de-DE"/>
           </a:p>
@@ -3802,7 +4942,7 @@
           <a:p>
             <a:fld id="{8FB60A0F-5ED1-45ED-A5D5-DB038E6B70D9}" type="datetimeFigureOut">
               <a:rPr lang="de-DE" smtClean="0"/>
-              <a:t>07.01.2022</a:t>
+              <a:t>12.01.2023</a:t>
             </a:fld>
             <a:endParaRPr lang="de-DE"/>
           </a:p>
@@ -4077,7 +5217,7 @@
           <a:p>
             <a:fld id="{8FB60A0F-5ED1-45ED-A5D5-DB038E6B70D9}" type="datetimeFigureOut">
               <a:rPr lang="de-DE" smtClean="0"/>
-              <a:t>07.01.2022</a:t>
+              <a:t>12.01.2023</a:t>
             </a:fld>
             <a:endParaRPr lang="de-DE"/>
           </a:p>
@@ -4342,7 +5482,7 @@
           <a:p>
             <a:fld id="{8FB60A0F-5ED1-45ED-A5D5-DB038E6B70D9}" type="datetimeFigureOut">
               <a:rPr lang="de-DE" smtClean="0"/>
-              <a:t>07.01.2022</a:t>
+              <a:t>12.01.2023</a:t>
             </a:fld>
             <a:endParaRPr lang="de-DE"/>
           </a:p>
@@ -4754,7 +5894,7 @@
           <a:p>
             <a:fld id="{8FB60A0F-5ED1-45ED-A5D5-DB038E6B70D9}" type="datetimeFigureOut">
               <a:rPr lang="de-DE" smtClean="0"/>
-              <a:t>07.01.2022</a:t>
+              <a:t>12.01.2023</a:t>
             </a:fld>
             <a:endParaRPr lang="de-DE"/>
           </a:p>
@@ -4895,7 +6035,7 @@
           <a:p>
             <a:fld id="{8FB60A0F-5ED1-45ED-A5D5-DB038E6B70D9}" type="datetimeFigureOut">
               <a:rPr lang="de-DE" smtClean="0"/>
-              <a:t>07.01.2022</a:t>
+              <a:t>12.01.2023</a:t>
             </a:fld>
             <a:endParaRPr lang="de-DE"/>
           </a:p>
@@ -5008,7 +6148,7 @@
           <a:p>
             <a:fld id="{8FB60A0F-5ED1-45ED-A5D5-DB038E6B70D9}" type="datetimeFigureOut">
               <a:rPr lang="de-DE" smtClean="0"/>
-              <a:t>07.01.2022</a:t>
+              <a:t>12.01.2023</a:t>
             </a:fld>
             <a:endParaRPr lang="de-DE"/>
           </a:p>
@@ -5319,7 +6459,7 @@
           <a:p>
             <a:fld id="{8FB60A0F-5ED1-45ED-A5D5-DB038E6B70D9}" type="datetimeFigureOut">
               <a:rPr lang="de-DE" smtClean="0"/>
-              <a:t>07.01.2022</a:t>
+              <a:t>12.01.2023</a:t>
             </a:fld>
             <a:endParaRPr lang="de-DE"/>
           </a:p>
@@ -5607,7 +6747,7 @@
           <a:p>
             <a:fld id="{8FB60A0F-5ED1-45ED-A5D5-DB038E6B70D9}" type="datetimeFigureOut">
               <a:rPr lang="de-DE" smtClean="0"/>
-              <a:t>07.01.2022</a:t>
+              <a:t>12.01.2023</a:t>
             </a:fld>
             <a:endParaRPr lang="de-DE"/>
           </a:p>
@@ -5848,7 +6988,7 @@
           <a:p>
             <a:fld id="{8FB60A0F-5ED1-45ED-A5D5-DB038E6B70D9}" type="datetimeFigureOut">
               <a:rPr lang="de-DE" smtClean="0"/>
-              <a:t>07.01.2022</a:t>
+              <a:t>12.01.2023</a:t>
             </a:fld>
             <a:endParaRPr lang="de-DE"/>
           </a:p>
@@ -6364,6 +7504,64 @@
 </p:sld>
 </file>
 
+<file path=ppt/slides/slide3.xml><?xml version="1.0" encoding="utf-8"?>
+<p:sld xmlns:a="http://schemas.openxmlformats.org/drawingml/2006/main" xmlns:r="http://schemas.openxmlformats.org/officeDocument/2006/relationships" xmlns:p="http://schemas.openxmlformats.org/presentationml/2006/main">
+  <p:cSld>
+    <p:spTree>
+      <p:nvGrpSpPr>
+        <p:cNvPr id="1" name=""/>
+        <p:cNvGrpSpPr/>
+        <p:nvPr/>
+      </p:nvGrpSpPr>
+      <p:grpSpPr>
+        <a:xfrm>
+          <a:off x="0" y="0"/>
+          <a:ext cx="0" cy="0"/>
+          <a:chOff x="0" y="0"/>
+          <a:chExt cx="0" cy="0"/>
+        </a:xfrm>
+      </p:grpSpPr>
+      <p:graphicFrame>
+        <p:nvGraphicFramePr>
+          <p:cNvPr id="6" name="ScatterPointImages">
+            <a:extLst>
+              <a:ext uri="{FF2B5EF4-FFF2-40B4-BE49-F238E27FC236}">
+                <a16:creationId xmlns:a16="http://schemas.microsoft.com/office/drawing/2014/main" id="{C687C97D-A731-4191-B8CE-878B34153102}"/>
+              </a:ext>
+            </a:extLst>
+          </p:cNvPr>
+          <p:cNvGraphicFramePr/>
+          <p:nvPr>
+            <p:extLst>
+              <p:ext uri="{D42A27DB-BD31-4B8C-83A1-F6EECF244321}">
+                <p14:modId xmlns:p14="http://schemas.microsoft.com/office/powerpoint/2010/main" val="1235958099"/>
+              </p:ext>
+            </p:extLst>
+          </p:nvPr>
+        </p:nvGraphicFramePr>
+        <p:xfrm>
+          <a:off x="1072339" y="656697"/>
+          <a:ext cx="7958772" cy="4770437"/>
+        </p:xfrm>
+        <a:graphic>
+          <a:graphicData uri="http://schemas.openxmlformats.org/drawingml/2006/chart">
+            <c:chart xmlns:c="http://schemas.openxmlformats.org/drawingml/2006/chart" xmlns:r="http://schemas.openxmlformats.org/officeDocument/2006/relationships" r:id="rId2"/>
+          </a:graphicData>
+        </a:graphic>
+      </p:graphicFrame>
+    </p:spTree>
+    <p:extLst>
+      <p:ext uri="{BB962C8B-B14F-4D97-AF65-F5344CB8AC3E}">
+        <p14:creationId xmlns:p14="http://schemas.microsoft.com/office/powerpoint/2010/main" val="634049618"/>
+      </p:ext>
+    </p:extLst>
+  </p:cSld>
+  <p:clrMapOvr>
+    <a:masterClrMapping/>
+  </p:clrMapOvr>
+</p:sld>
+</file>
+
 <file path=ppt/theme/theme1.xml><?xml version="1.0" encoding="utf-8"?>
 <a:theme xmlns:a="http://schemas.openxmlformats.org/drawingml/2006/main" name="Office">
   <a:themeElements>

</xml_diff>

<commit_message>
feat(chart): support 'a:fld' data label style for scatter charts
</commit_message>
<xml_diff>
--- a/__tests__/pptx-templates/ChartScatter.pptx
+++ b/__tests__/pptx-templates/ChartScatter.pptx
@@ -8,6 +8,7 @@
     <p:sldId id="256" r:id="rId2"/>
     <p:sldId id="257" r:id="rId3"/>
     <p:sldId id="258" r:id="rId4"/>
+    <p:sldId id="259" r:id="rId5"/>
   </p:sldIdLst>
   <p:sldSz cx="12192000" cy="6858000"/>
   <p:notesSz cx="6858000" cy="9144000"/>
@@ -188,12 +189,12 @@
                   <a:bodyPr/>
                   <a:lstStyle/>
                   <a:p>
-                    <a:fld id="{ECDCC2E7-3492-49FC-A1A9-2006A03807AD}" type="CELLRANGE">
+                    <a:fld id="{46D44DF0-06D9-4AE1-8F76-3BFBCC761E74}" type="CELLRANGE">
                       <a:rPr lang="en-US"/>
                       <a:pPr/>
                       <a:t>[ZELLBEREICH]</a:t>
                     </a:fld>
-                    <a:endParaRPr lang="de-DE"/>
+                    <a:endParaRPr lang="en-US"/>
                   </a:p>
                 </c:rich>
               </c:tx>
@@ -220,12 +221,12 @@
                   <a:bodyPr/>
                   <a:lstStyle/>
                   <a:p>
-                    <a:fld id="{6B399F7B-3A83-4DA1-B6DB-4031FC4DC367}" type="CELLRANGE">
-                      <a:rPr lang="de-DE"/>
+                    <a:fld id="{FCE29115-6116-49EF-B2E8-D94426931BFB}" type="CELLRANGE">
+                      <a:rPr lang="en-US"/>
                       <a:pPr/>
                       <a:t>[ZELLBEREICH]</a:t>
                     </a:fld>
-                    <a:endParaRPr lang="de-DE"/>
+                    <a:endParaRPr lang="en-US"/>
                   </a:p>
                 </c:rich>
               </c:tx>
@@ -253,12 +254,12 @@
                   <a:bodyPr/>
                   <a:lstStyle/>
                   <a:p>
-                    <a:fld id="{CBED623B-9426-472F-BC3A-E212B02883DE}" type="CELLRANGE">
-                      <a:rPr lang="de-DE"/>
+                    <a:fld id="{97E6FC33-E03A-4680-B54E-0FFCA6859602}" type="CELLRANGE">
+                      <a:rPr lang="en-US"/>
                       <a:pPr/>
                       <a:t>[ZELLBEREICH]</a:t>
                     </a:fld>
-                    <a:endParaRPr lang="de-DE"/>
+                    <a:endParaRPr lang="en-US"/>
                   </a:p>
                 </c:rich>
               </c:tx>
@@ -286,12 +287,12 @@
                   <a:bodyPr/>
                   <a:lstStyle/>
                   <a:p>
-                    <a:fld id="{04936111-54BC-43C3-9899-E544CA1FCE66}" type="CELLRANGE">
-                      <a:rPr lang="de-DE"/>
+                    <a:fld id="{7D6B30C0-F954-4668-9881-D95EEB3ECE28}" type="CELLRANGE">
+                      <a:rPr lang="en-US"/>
                       <a:pPr/>
                       <a:t>[ZELLBEREICH]</a:t>
                     </a:fld>
-                    <a:endParaRPr lang="de-DE"/>
+                    <a:endParaRPr lang="en-US"/>
                   </a:p>
                 </c:rich>
               </c:tx>
@@ -319,12 +320,12 @@
                   <a:bodyPr/>
                   <a:lstStyle/>
                   <a:p>
-                    <a:fld id="{A52D54D1-656B-42BB-B6BF-D22995F007AB}" type="CELLRANGE">
-                      <a:rPr lang="de-DE"/>
+                    <a:fld id="{E4F0BEB5-5C0F-492A-89E0-D8008E71203F}" type="CELLRANGE">
+                      <a:rPr lang="en-US"/>
                       <a:pPr/>
                       <a:t>[ZELLBEREICH]</a:t>
                     </a:fld>
-                    <a:endParaRPr lang="de-DE"/>
+                    <a:endParaRPr lang="en-US"/>
                   </a:p>
                 </c:rich>
               </c:tx>
@@ -524,12 +525,12 @@
                   <a:bodyPr/>
                   <a:lstStyle/>
                   <a:p>
-                    <a:fld id="{21E885AE-7069-4421-B2A3-1CFD0A017AEA}" type="CELLRANGE">
+                    <a:fld id="{6AFB1DD2-0050-448D-8B9C-1A7B284D2059}" type="CELLRANGE">
                       <a:rPr lang="en-US"/>
                       <a:pPr/>
                       <a:t>[ZELLBEREICH]</a:t>
                     </a:fld>
-                    <a:endParaRPr lang="de-DE"/>
+                    <a:endParaRPr lang="en-US"/>
                   </a:p>
                 </c:rich>
               </c:tx>
@@ -556,12 +557,12 @@
                   <a:bodyPr/>
                   <a:lstStyle/>
                   <a:p>
-                    <a:fld id="{6B2FEE3F-F1F3-49E4-A8BD-99A2BB56F9E2}" type="CELLRANGE">
-                      <a:rPr lang="de-DE"/>
+                    <a:fld id="{5EBE378A-835C-42E1-BF0F-8D225FD8F4CC}" type="CELLRANGE">
+                      <a:rPr lang="en-US"/>
                       <a:pPr/>
                       <a:t>[ZELLBEREICH]</a:t>
                     </a:fld>
-                    <a:endParaRPr lang="de-DE"/>
+                    <a:endParaRPr lang="en-US"/>
                   </a:p>
                 </c:rich>
               </c:tx>
@@ -589,12 +590,12 @@
                   <a:bodyPr/>
                   <a:lstStyle/>
                   <a:p>
-                    <a:fld id="{0921B0B8-7A1D-44DF-8884-ECBDC07242D3}" type="CELLRANGE">
-                      <a:rPr lang="de-DE"/>
+                    <a:fld id="{BA16F164-A755-49A7-B117-C466095DB813}" type="CELLRANGE">
+                      <a:rPr lang="en-US"/>
                       <a:pPr/>
                       <a:t>[ZELLBEREICH]</a:t>
                     </a:fld>
-                    <a:endParaRPr lang="de-DE"/>
+                    <a:endParaRPr lang="en-US"/>
                   </a:p>
                 </c:rich>
               </c:tx>
@@ -622,12 +623,12 @@
                   <a:bodyPr/>
                   <a:lstStyle/>
                   <a:p>
-                    <a:fld id="{E0759279-F1A8-4696-9B09-90B7E85C7DC4}" type="CELLRANGE">
-                      <a:rPr lang="de-DE"/>
+                    <a:fld id="{C26F4A17-1051-453A-8CF8-F73B06A63E1A}" type="CELLRANGE">
+                      <a:rPr lang="en-US"/>
                       <a:pPr/>
                       <a:t>[ZELLBEREICH]</a:t>
                     </a:fld>
-                    <a:endParaRPr lang="de-DE"/>
+                    <a:endParaRPr lang="en-US"/>
                   </a:p>
                 </c:rich>
               </c:tx>
@@ -655,12 +656,12 @@
                   <a:bodyPr/>
                   <a:lstStyle/>
                   <a:p>
-                    <a:fld id="{9287ADB7-6005-4CC3-90E0-607607CD0C8D}" type="CELLRANGE">
-                      <a:rPr lang="de-DE"/>
+                    <a:fld id="{6ED31795-9FED-4FE5-B87E-2DEDA8DDC6A5}" type="CELLRANGE">
+                      <a:rPr lang="en-US"/>
                       <a:pPr/>
                       <a:t>[ZELLBEREICH]</a:t>
                     </a:fld>
-                    <a:endParaRPr lang="de-DE"/>
+                    <a:endParaRPr lang="en-US"/>
                   </a:p>
                 </c:rich>
               </c:tx>
@@ -1126,12 +1127,12 @@
                   <a:bodyPr/>
                   <a:lstStyle/>
                   <a:p>
-                    <a:fld id="{F90715B7-F735-42D1-95A5-31DA7DF4779F}" type="CELLRANGE">
+                    <a:fld id="{EF5B6417-0904-402B-B8BE-84DA4A5DC921}" type="CELLRANGE">
                       <a:rPr lang="en-US"/>
                       <a:pPr/>
                       <a:t>[ZELLBEREICH]</a:t>
                     </a:fld>
-                    <a:endParaRPr lang="de-DE"/>
+                    <a:endParaRPr lang="en-US"/>
                   </a:p>
                 </c:rich>
               </c:tx>
@@ -1155,18 +1156,64 @@
               <c:idx val="1"/>
               <c:tx>
                 <c:rich>
-                  <a:bodyPr/>
+                  <a:bodyPr rot="0" spcFirstLastPara="1" vertOverflow="ellipsis" vert="horz" wrap="square" lIns="38100" tIns="19050" rIns="38100" bIns="19050" anchor="ctr" anchorCtr="1">
+                    <a:spAutoFit/>
+                  </a:bodyPr>
                   <a:lstStyle/>
                   <a:p>
-                    <a:fld id="{E3744FF2-02B7-4ABC-B495-A482F6EBB665}" type="CELLRANGE">
-                      <a:rPr lang="de-DE"/>
-                      <a:pPr/>
+                    <a:pPr>
+                      <a:defRPr sz="1050" b="0" i="0" u="none" strike="noStrike" kern="1200" baseline="0">
+                        <a:solidFill>
+                          <a:schemeClr val="tx1">
+                            <a:lumMod val="75000"/>
+                            <a:lumOff val="25000"/>
+                          </a:schemeClr>
+                        </a:solidFill>
+                        <a:latin typeface="+mn-lt"/>
+                        <a:ea typeface="+mn-ea"/>
+                        <a:cs typeface="+mn-cs"/>
+                      </a:defRPr>
+                    </a:pPr>
+                    <a:fld id="{803FE6FE-9840-4E51-8838-DFEFC95820A2}" type="CELLRANGE">
+                      <a:rPr lang="en-US"/>
+                      <a:pPr>
+                        <a:defRPr sz="1050"/>
+                      </a:pPr>
                       <a:t>[ZELLBEREICH]</a:t>
                     </a:fld>
-                    <a:endParaRPr lang="de-DE"/>
+                    <a:endParaRPr lang="en-US"/>
                   </a:p>
                 </c:rich>
               </c:tx>
+              <c:spPr>
+                <a:noFill/>
+                <a:ln>
+                  <a:noFill/>
+                </a:ln>
+                <a:effectLst/>
+              </c:spPr>
+              <c:txPr>
+                <a:bodyPr rot="0" spcFirstLastPara="1" vertOverflow="ellipsis" vert="horz" wrap="square" lIns="38100" tIns="19050" rIns="38100" bIns="19050" anchor="ctr" anchorCtr="1">
+                  <a:spAutoFit/>
+                </a:bodyPr>
+                <a:lstStyle/>
+                <a:p>
+                  <a:pPr>
+                    <a:defRPr sz="1050" b="0" i="0" u="none" strike="noStrike" kern="1200" baseline="0">
+                      <a:solidFill>
+                        <a:schemeClr val="tx1">
+                          <a:lumMod val="75000"/>
+                          <a:lumOff val="25000"/>
+                        </a:schemeClr>
+                      </a:solidFill>
+                      <a:latin typeface="+mn-lt"/>
+                      <a:ea typeface="+mn-ea"/>
+                      <a:cs typeface="+mn-cs"/>
+                    </a:defRPr>
+                  </a:pPr>
+                  <a:endParaRPr lang="de-DE"/>
+                </a:p>
+              </c:txPr>
               <c:showLegendKey val="0"/>
               <c:showVal val="0"/>
               <c:showCatName val="0"/>
@@ -1191,12 +1238,12 @@
                   <a:bodyPr/>
                   <a:lstStyle/>
                   <a:p>
-                    <a:fld id="{298DE7A5-4492-45F2-BC80-3194D67DD7EC}" type="CELLRANGE">
-                      <a:rPr lang="de-DE"/>
+                    <a:fld id="{E8220BFF-2F69-4899-AC8D-54C0924A91FE}" type="CELLRANGE">
+                      <a:rPr lang="en-US"/>
                       <a:pPr/>
                       <a:t>[ZELLBEREICH]</a:t>
                     </a:fld>
-                    <a:endParaRPr lang="de-DE"/>
+                    <a:endParaRPr lang="en-US"/>
                   </a:p>
                 </c:rich>
               </c:tx>
@@ -1224,12 +1271,12 @@
                   <a:bodyPr/>
                   <a:lstStyle/>
                   <a:p>
-                    <a:fld id="{42C5AE86-AA7D-457A-BCF6-F26BC6EBCCC2}" type="CELLRANGE">
-                      <a:rPr lang="de-DE"/>
+                    <a:fld id="{1E002EDB-5F64-478A-BAEF-756D67B75487}" type="CELLRANGE">
+                      <a:rPr lang="en-US"/>
                       <a:pPr/>
                       <a:t>[ZELLBEREICH]</a:t>
                     </a:fld>
-                    <a:endParaRPr lang="de-DE"/>
+                    <a:endParaRPr lang="en-US"/>
                   </a:p>
                 </c:rich>
               </c:tx>
@@ -1257,12 +1304,12 @@
                   <a:bodyPr/>
                   <a:lstStyle/>
                   <a:p>
-                    <a:fld id="{61EDD350-940B-4C43-A276-459971E865E4}" type="CELLRANGE">
-                      <a:rPr lang="de-DE"/>
+                    <a:fld id="{7A7BB3ED-BD31-48AD-AAD4-35933376015D}" type="CELLRANGE">
+                      <a:rPr lang="en-US"/>
                       <a:pPr/>
                       <a:t>[ZELLBEREICH]</a:t>
                     </a:fld>
-                    <a:endParaRPr lang="de-DE"/>
+                    <a:endParaRPr lang="en-US"/>
                   </a:p>
                 </c:rich>
               </c:tx>
@@ -1462,12 +1509,12 @@
                   <a:bodyPr/>
                   <a:lstStyle/>
                   <a:p>
-                    <a:fld id="{2FD9B332-A9C6-4861-B3B9-71FE9FF54805}" type="CELLRANGE">
+                    <a:fld id="{FA55B766-8AF5-4FE6-9384-7DE007EA6F44}" type="CELLRANGE">
                       <a:rPr lang="en-US"/>
                       <a:pPr/>
                       <a:t>[ZELLBEREICH]</a:t>
                     </a:fld>
-                    <a:endParaRPr lang="de-DE"/>
+                    <a:endParaRPr lang="en-US"/>
                   </a:p>
                 </c:rich>
               </c:tx>
@@ -1494,12 +1541,12 @@
                   <a:bodyPr/>
                   <a:lstStyle/>
                   <a:p>
-                    <a:fld id="{DAA160D5-9413-43F4-8F64-422957526B18}" type="CELLRANGE">
-                      <a:rPr lang="de-DE"/>
+                    <a:fld id="{D861ED4F-5FFB-4682-B968-E319B293A37A}" type="CELLRANGE">
+                      <a:rPr lang="en-US"/>
                       <a:pPr/>
                       <a:t>[ZELLBEREICH]</a:t>
                     </a:fld>
-                    <a:endParaRPr lang="de-DE"/>
+                    <a:endParaRPr lang="en-US"/>
                   </a:p>
                 </c:rich>
               </c:tx>
@@ -1527,12 +1574,12 @@
                   <a:bodyPr/>
                   <a:lstStyle/>
                   <a:p>
-                    <a:fld id="{0BE7C7F0-761E-4C73-8AC5-75ED8E3ABAFE}" type="CELLRANGE">
-                      <a:rPr lang="de-DE"/>
+                    <a:fld id="{D45BD90B-F6BB-409B-95EF-AB7301DB6C72}" type="CELLRANGE">
+                      <a:rPr lang="en-US"/>
                       <a:pPr/>
                       <a:t>[ZELLBEREICH]</a:t>
                     </a:fld>
-                    <a:endParaRPr lang="de-DE"/>
+                    <a:endParaRPr lang="en-US"/>
                   </a:p>
                 </c:rich>
               </c:tx>
@@ -1560,12 +1607,12 @@
                   <a:bodyPr/>
                   <a:lstStyle/>
                   <a:p>
-                    <a:fld id="{5C48B750-E271-4B41-A374-0F647E1FC140}" type="CELLRANGE">
-                      <a:rPr lang="de-DE"/>
+                    <a:fld id="{BB0538FD-649B-4367-8F63-79E7613987FC}" type="CELLRANGE">
+                      <a:rPr lang="en-US"/>
                       <a:pPr/>
                       <a:t>[ZELLBEREICH]</a:t>
                     </a:fld>
-                    <a:endParaRPr lang="de-DE"/>
+                    <a:endParaRPr lang="en-US"/>
                   </a:p>
                 </c:rich>
               </c:tx>
@@ -1593,12 +1640,12 @@
                   <a:bodyPr/>
                   <a:lstStyle/>
                   <a:p>
-                    <a:fld id="{77FE1C4C-733E-4C40-AF9C-B7860F7ABDD6}" type="CELLRANGE">
-                      <a:rPr lang="de-DE"/>
+                    <a:fld id="{54D053C7-F0D8-40E3-BB8F-E19E8EDE06B9}" type="CELLRANGE">
+                      <a:rPr lang="en-US"/>
                       <a:pPr/>
                       <a:t>[ZELLBEREICH]</a:t>
                     </a:fld>
-                    <a:endParaRPr lang="de-DE"/>
+                    <a:endParaRPr lang="en-US"/>
                   </a:p>
                 </c:rich>
               </c:tx>
@@ -2021,7 +2068,7 @@
             <c:symbol val="picture"/>
             <c:spPr>
               <a:blipFill>
-                <a:blip xmlns:r="http://schemas.openxmlformats.org/officeDocument/2006/relationships" r:embed="rId3"/>
+                <a:blip xmlns:r="http://schemas.openxmlformats.org/officeDocument/2006/relationships" r:embed="rId1"/>
                 <a:stretch>
                   <a:fillRect/>
                 </a:stretch>
@@ -2036,23 +2083,6 @@
           </c:marker>
           <c:dPt>
             <c:idx val="0"/>
-            <c:marker>
-              <c:symbol val="picture"/>
-              <c:spPr>
-                <a:blipFill>
-                  <a:blip xmlns:r="http://schemas.openxmlformats.org/officeDocument/2006/relationships" r:embed="rId3"/>
-                  <a:stretch>
-                    <a:fillRect/>
-                  </a:stretch>
-                </a:blipFill>
-                <a:ln w="9525">
-                  <a:solidFill>
-                    <a:schemeClr val="accent2"/>
-                  </a:solidFill>
-                </a:ln>
-                <a:effectLst/>
-              </c:spPr>
-            </c:marker>
             <c:bubble3D val="0"/>
             <c:extLst>
               <c:ext xmlns:c16="http://schemas.microsoft.com/office/drawing/2014/chart" uri="{C3380CC4-5D6E-409C-BE32-E72D297353CC}">
@@ -2068,12 +2098,12 @@
                   <a:bodyPr/>
                   <a:lstStyle/>
                   <a:p>
-                    <a:fld id="{F90715B7-F735-42D1-95A5-31DA7DF4779F}" type="CELLRANGE">
+                    <a:fld id="{5E79D993-4F75-48B2-8AF0-696F5FADCAE8}" type="CELLRANGE">
                       <a:rPr lang="en-US"/>
                       <a:pPr/>
                       <a:t>[ZELLBEREICH]</a:t>
                     </a:fld>
-                    <a:endParaRPr lang="de-DE"/>
+                    <a:endParaRPr lang="en-US"/>
                   </a:p>
                 </c:rich>
               </c:tx>
@@ -2100,12 +2130,12 @@
                   <a:bodyPr/>
                   <a:lstStyle/>
                   <a:p>
-                    <a:fld id="{4F225748-B631-48A0-ADF3-607D3889F12B}" type="CELLRANGE">
-                      <a:rPr lang="de-DE"/>
+                    <a:fld id="{C5F85FF3-578E-4C64-8E5E-7076B8C13382}" type="CELLRANGE">
+                      <a:rPr lang="en-US"/>
                       <a:pPr/>
                       <a:t>[ZELLBEREICH]</a:t>
                     </a:fld>
-                    <a:endParaRPr lang="de-DE"/>
+                    <a:endParaRPr lang="en-US"/>
                   </a:p>
                 </c:rich>
               </c:tx>
@@ -2133,12 +2163,12 @@
                   <a:bodyPr/>
                   <a:lstStyle/>
                   <a:p>
-                    <a:fld id="{002879B4-F90E-4FC5-B8B2-6D57F2F6E6A1}" type="CELLRANGE">
-                      <a:rPr lang="de-DE"/>
+                    <a:fld id="{B00AFB8B-7044-4535-8B27-B87DC4E34034}" type="CELLRANGE">
+                      <a:rPr lang="en-US"/>
                       <a:pPr/>
                       <a:t>[ZELLBEREICH]</a:t>
                     </a:fld>
-                    <a:endParaRPr lang="de-DE"/>
+                    <a:endParaRPr lang="en-US"/>
                   </a:p>
                 </c:rich>
               </c:tx>
@@ -2166,12 +2196,12 @@
                   <a:bodyPr/>
                   <a:lstStyle/>
                   <a:p>
-                    <a:fld id="{6BC848D4-60A1-441E-99E2-3077C33E38D6}" type="CELLRANGE">
-                      <a:rPr lang="de-DE"/>
+                    <a:fld id="{0CC6AD75-38D8-4BF1-AD6B-7ADBDDB40696}" type="CELLRANGE">
+                      <a:rPr lang="en-US"/>
                       <a:pPr/>
                       <a:t>[ZELLBEREICH]</a:t>
                     </a:fld>
-                    <a:endParaRPr lang="de-DE"/>
+                    <a:endParaRPr lang="en-US"/>
                   </a:p>
                 </c:rich>
               </c:tx>
@@ -2199,12 +2229,12 @@
                   <a:bodyPr/>
                   <a:lstStyle/>
                   <a:p>
-                    <a:fld id="{983DC7C5-5266-4051-8499-2E447F03DC78}" type="CELLRANGE">
-                      <a:rPr lang="de-DE"/>
+                    <a:fld id="{1A415A41-EB28-4E80-B149-E8681BDDDE63}" type="CELLRANGE">
+                      <a:rPr lang="en-US"/>
                       <a:pPr/>
                       <a:t>[ZELLBEREICH]</a:t>
                     </a:fld>
-                    <a:endParaRPr lang="de-DE"/>
+                    <a:endParaRPr lang="en-US"/>
                   </a:p>
                 </c:rich>
               </c:tx>
@@ -2556,7 +2586,535 @@
       <a:endParaRPr lang="de-DE"/>
     </a:p>
   </c:txPr>
-  <c:externalData r:id="rId4">
+  <c:externalData r:id="rId2">
+    <c:autoUpdate val="0"/>
+  </c:externalData>
+</c:chartSpace>
+</file>
+
+<file path=ppt/charts/chart4.xml><?xml version="1.0" encoding="utf-8"?>
+<c:chartSpace xmlns:c="http://schemas.openxmlformats.org/drawingml/2006/chart" xmlns:a="http://schemas.openxmlformats.org/drawingml/2006/main" xmlns:r="http://schemas.openxmlformats.org/officeDocument/2006/relationships" xmlns:c16r2="http://schemas.microsoft.com/office/drawing/2015/06/chart">
+  <c:date1904 val="0"/>
+  <c:lang val="de-DE"/>
+  <c:roundedCorners val="0"/>
+  <mc:AlternateContent xmlns:mc="http://schemas.openxmlformats.org/markup-compatibility/2006">
+    <mc:Choice xmlns:c14="http://schemas.microsoft.com/office/drawing/2007/8/2/chart" Requires="c14">
+      <c14:style val="102"/>
+    </mc:Choice>
+    <mc:Fallback>
+      <c:style val="2"/>
+    </mc:Fallback>
+  </mc:AlternateContent>
+  <c:chart>
+    <c:autoTitleDeleted val="1"/>
+    <c:plotArea>
+      <c:layout>
+        <c:manualLayout>
+          <c:layoutTarget val="inner"/>
+          <c:xMode val="edge"/>
+          <c:yMode val="edge"/>
+          <c:x val="4.542346482598069E-2"/>
+          <c:y val="3.6552416476729493E-2"/>
+          <c:w val="0.92379012742166755"/>
+          <c:h val="0.8911129106201382"/>
+        </c:manualLayout>
+      </c:layout>
+      <c:scatterChart>
+        <c:scatterStyle val="lineMarker"/>
+        <c:varyColors val="0"/>
+        <c:ser>
+          <c:idx val="1"/>
+          <c:order val="0"/>
+          <c:tx>
+            <c:strRef>
+              <c:f>Tabelle1!$B$1</c:f>
+              <c:strCache>
+                <c:ptCount val="1"/>
+                <c:pt idx="0">
+                  <c:v>Series1-X</c:v>
+                </c:pt>
+              </c:strCache>
+            </c:strRef>
+          </c:tx>
+          <c:spPr>
+            <a:ln w="25400" cap="rnd">
+              <a:noFill/>
+              <a:round/>
+            </a:ln>
+            <a:effectLst/>
+          </c:spPr>
+          <c:marker>
+            <c:symbol val="circle"/>
+            <c:size val="10"/>
+            <c:spPr>
+              <a:solidFill>
+                <a:schemeClr val="accent2"/>
+              </a:solidFill>
+              <a:ln w="9525">
+                <a:solidFill>
+                  <a:schemeClr val="accent2"/>
+                </a:solidFill>
+              </a:ln>
+              <a:effectLst/>
+            </c:spPr>
+          </c:marker>
+          <c:dPt>
+            <c:idx val="0"/>
+            <c:marker>
+              <c:symbol val="circle"/>
+              <c:size val="14"/>
+              <c:spPr>
+                <a:solidFill>
+                  <a:srgbClr val="010000"/>
+                </a:solidFill>
+                <a:ln w="9525">
+                  <a:solidFill>
+                    <a:schemeClr val="accent2"/>
+                  </a:solidFill>
+                </a:ln>
+                <a:effectLst/>
+              </c:spPr>
+            </c:marker>
+            <c:bubble3D val="0"/>
+            <c:extLst>
+              <c:ext xmlns:c16="http://schemas.microsoft.com/office/drawing/2014/chart" uri="{C3380CC4-5D6E-409C-BE32-E72D297353CC}">
+                <c16:uniqueId val="{00000000-FE96-4B7B-86E1-8FECF11C9C1B}"/>
+              </c:ext>
+            </c:extLst>
+          </c:dPt>
+          <c:dLbls>
+            <c:dLbl>
+              <c:idx val="0"/>
+              <c:tx>
+                <c:rich>
+                  <a:bodyPr rot="0" spcFirstLastPara="1" vertOverflow="ellipsis" vert="horz" wrap="square" lIns="38100" tIns="19050" rIns="38100" bIns="19050" anchor="ctr" anchorCtr="1">
+                    <a:spAutoFit/>
+                  </a:bodyPr>
+                  <a:lstStyle/>
+                  <a:p>
+                    <a:pPr>
+                      <a:defRPr sz="1400" b="0" i="0" u="none" strike="noStrike" kern="1200" baseline="0">
+                        <a:solidFill>
+                          <a:schemeClr val="tx1">
+                            <a:lumMod val="75000"/>
+                            <a:lumOff val="25000"/>
+                          </a:schemeClr>
+                        </a:solidFill>
+                        <a:latin typeface="+mn-lt"/>
+                        <a:ea typeface="+mn-ea"/>
+                        <a:cs typeface="+mn-cs"/>
+                      </a:defRPr>
+                    </a:pPr>
+                    <a:fld id="{1B09DD2C-8A8B-4A3F-A154-9049FD3B30CC}" type="CELLRANGE">
+                      <a:rPr lang="en-US"/>
+                      <a:pPr>
+                        <a:defRPr sz="1400"/>
+                      </a:pPr>
+                      <a:t>[ZELLBEREICH]</a:t>
+                    </a:fld>
+                    <a:endParaRPr lang="en-US"/>
+                  </a:p>
+                </c:rich>
+              </c:tx>
+              <c:spPr>
+                <a:noFill/>
+                <a:ln>
+                  <a:noFill/>
+                </a:ln>
+                <a:effectLst/>
+              </c:spPr>
+              <c:txPr>
+                <a:bodyPr rot="0" spcFirstLastPara="1" vertOverflow="ellipsis" vert="horz" wrap="square" lIns="38100" tIns="19050" rIns="38100" bIns="19050" anchor="ctr" anchorCtr="1">
+                  <a:spAutoFit/>
+                </a:bodyPr>
+                <a:lstStyle/>
+                <a:p>
+                  <a:pPr>
+                    <a:defRPr sz="1400" b="0" i="0" u="none" strike="noStrike" kern="1200" baseline="0">
+                      <a:solidFill>
+                        <a:schemeClr val="tx1">
+                          <a:lumMod val="75000"/>
+                          <a:lumOff val="25000"/>
+                        </a:schemeClr>
+                      </a:solidFill>
+                      <a:latin typeface="+mn-lt"/>
+                      <a:ea typeface="+mn-ea"/>
+                      <a:cs typeface="+mn-cs"/>
+                    </a:defRPr>
+                  </a:pPr>
+                  <a:endParaRPr lang="de-DE"/>
+                </a:p>
+              </c:txPr>
+              <c:showLegendKey val="0"/>
+              <c:showVal val="0"/>
+              <c:showCatName val="0"/>
+              <c:showSerName val="0"/>
+              <c:showPercent val="0"/>
+              <c:showBubbleSize val="0"/>
+              <c:extLst>
+                <c:ext xmlns:c15="http://schemas.microsoft.com/office/drawing/2012/chart" uri="{CE6537A1-D6FC-4f65-9D91-7224C49458BB}">
+                  <c15:dlblFieldTable/>
+                  <c15:xForSave val="1"/>
+                  <c15:showDataLabelsRange val="1"/>
+                </c:ext>
+                <c:ext xmlns:c16="http://schemas.microsoft.com/office/drawing/2014/chart" uri="{C3380CC4-5D6E-409C-BE32-E72D297353CC}">
+                  <c16:uniqueId val="{00000000-FE96-4B7B-86E1-8FECF11C9C1B}"/>
+                </c:ext>
+              </c:extLst>
+            </c:dLbl>
+            <c:dLbl>
+              <c:idx val="1"/>
+              <c:tx>
+                <c:rich>
+                  <a:bodyPr rot="0" spcFirstLastPara="1" vertOverflow="ellipsis" vert="horz" wrap="square" lIns="38100" tIns="19050" rIns="38100" bIns="19050" anchor="ctr" anchorCtr="1">
+                    <a:spAutoFit/>
+                  </a:bodyPr>
+                  <a:lstStyle/>
+                  <a:p>
+                    <a:pPr>
+                      <a:defRPr sz="1100" b="0" i="0" u="none" strike="noStrike" kern="1200" baseline="0">
+                        <a:solidFill>
+                          <a:schemeClr val="tx1">
+                            <a:lumMod val="75000"/>
+                            <a:lumOff val="25000"/>
+                          </a:schemeClr>
+                        </a:solidFill>
+                        <a:latin typeface="+mn-lt"/>
+                        <a:ea typeface="+mn-ea"/>
+                        <a:cs typeface="+mn-cs"/>
+                      </a:defRPr>
+                    </a:pPr>
+                    <a:fld id="{E5476C43-00F1-4EEB-8586-2503022D6913}" type="CELLRANGE">
+                      <a:rPr lang="en-US"/>
+                      <a:pPr>
+                        <a:defRPr sz="1100"/>
+                      </a:pPr>
+                      <a:t>[ZELLBEREICH]</a:t>
+                    </a:fld>
+                    <a:endParaRPr lang="en-US"/>
+                  </a:p>
+                </c:rich>
+              </c:tx>
+              <c:spPr>
+                <a:noFill/>
+                <a:ln>
+                  <a:noFill/>
+                </a:ln>
+                <a:effectLst/>
+              </c:spPr>
+              <c:txPr>
+                <a:bodyPr rot="0" spcFirstLastPara="1" vertOverflow="ellipsis" vert="horz" wrap="square" lIns="38100" tIns="19050" rIns="38100" bIns="19050" anchor="ctr" anchorCtr="1">
+                  <a:spAutoFit/>
+                </a:bodyPr>
+                <a:lstStyle/>
+                <a:p>
+                  <a:pPr>
+                    <a:defRPr sz="1100" b="0" i="0" u="none" strike="noStrike" kern="1200" baseline="0">
+                      <a:solidFill>
+                        <a:schemeClr val="tx1">
+                          <a:lumMod val="75000"/>
+                          <a:lumOff val="25000"/>
+                        </a:schemeClr>
+                      </a:solidFill>
+                      <a:latin typeface="+mn-lt"/>
+                      <a:ea typeface="+mn-ea"/>
+                      <a:cs typeface="+mn-cs"/>
+                    </a:defRPr>
+                  </a:pPr>
+                  <a:endParaRPr lang="de-DE"/>
+                </a:p>
+              </c:txPr>
+              <c:showLegendKey val="0"/>
+              <c:showVal val="0"/>
+              <c:showCatName val="0"/>
+              <c:showSerName val="0"/>
+              <c:showPercent val="0"/>
+              <c:showBubbleSize val="0"/>
+              <c:extLst>
+                <c:ext xmlns:c15="http://schemas.microsoft.com/office/drawing/2012/chart" uri="{CE6537A1-D6FC-4f65-9D91-7224C49458BB}">
+                  <c15:dlblFieldTable/>
+                  <c15:xForSave val="1"/>
+                  <c15:showDataLabelsRange val="1"/>
+                </c:ext>
+                <c:ext xmlns:c16="http://schemas.microsoft.com/office/drawing/2014/chart" uri="{C3380CC4-5D6E-409C-BE32-E72D297353CC}">
+                  <c16:uniqueId val="{00000001-FE96-4B7B-86E1-8FECF11C9C1B}"/>
+                </c:ext>
+              </c:extLst>
+            </c:dLbl>
+            <c:spPr>
+              <a:noFill/>
+              <a:ln>
+                <a:noFill/>
+              </a:ln>
+              <a:effectLst/>
+            </c:spPr>
+            <c:txPr>
+              <a:bodyPr rot="0" spcFirstLastPara="1" vertOverflow="ellipsis" vert="horz" wrap="square" lIns="38100" tIns="19050" rIns="38100" bIns="19050" anchor="ctr" anchorCtr="1">
+                <a:spAutoFit/>
+              </a:bodyPr>
+              <a:lstStyle/>
+              <a:p>
+                <a:pPr>
+                  <a:defRPr sz="1197" b="0" i="0" u="none" strike="noStrike" kern="1200" baseline="0">
+                    <a:solidFill>
+                      <a:schemeClr val="tx1">
+                        <a:lumMod val="75000"/>
+                        <a:lumOff val="25000"/>
+                      </a:schemeClr>
+                    </a:solidFill>
+                    <a:latin typeface="+mn-lt"/>
+                    <a:ea typeface="+mn-ea"/>
+                    <a:cs typeface="+mn-cs"/>
+                  </a:defRPr>
+                </a:pPr>
+                <a:endParaRPr lang="de-DE"/>
+              </a:p>
+            </c:txPr>
+            <c:showLegendKey val="0"/>
+            <c:showVal val="0"/>
+            <c:showCatName val="0"/>
+            <c:showSerName val="0"/>
+            <c:showPercent val="0"/>
+            <c:showBubbleSize val="0"/>
+            <c:showLeaderLines val="0"/>
+            <c:extLst>
+              <c:ext xmlns:c15="http://schemas.microsoft.com/office/drawing/2012/chart" uri="{CE6537A1-D6FC-4f65-9D91-7224C49458BB}">
+                <c15:showDataLabelsRange val="1"/>
+                <c15:showLeaderLines val="1"/>
+                <c15:leaderLines>
+                  <c:spPr>
+                    <a:ln w="9525" cap="flat" cmpd="sng" algn="ctr">
+                      <a:solidFill>
+                        <a:schemeClr val="tx1">
+                          <a:lumMod val="35000"/>
+                          <a:lumOff val="65000"/>
+                        </a:schemeClr>
+                      </a:solidFill>
+                      <a:round/>
+                    </a:ln>
+                    <a:effectLst/>
+                  </c:spPr>
+                </c15:leaderLines>
+              </c:ext>
+            </c:extLst>
+          </c:dLbls>
+          <c:xVal>
+            <c:numRef>
+              <c:f>Tabelle1!$B$2:$B$3</c:f>
+              <c:numCache>
+                <c:formatCode>General</c:formatCode>
+                <c:ptCount val="2"/>
+                <c:pt idx="0">
+                  <c:v>5</c:v>
+                </c:pt>
+                <c:pt idx="1">
+                  <c:v>8</c:v>
+                </c:pt>
+              </c:numCache>
+            </c:numRef>
+          </c:xVal>
+          <c:yVal>
+            <c:numRef>
+              <c:f>Tabelle1!$C$2:$C$3</c:f>
+              <c:numCache>
+                <c:formatCode>General</c:formatCode>
+                <c:ptCount val="2"/>
+                <c:pt idx="0">
+                  <c:v>3</c:v>
+                </c:pt>
+                <c:pt idx="1">
+                  <c:v>5</c:v>
+                </c:pt>
+              </c:numCache>
+            </c:numRef>
+          </c:yVal>
+          <c:smooth val="0"/>
+          <c:extLst>
+            <c:ext xmlns:c15="http://schemas.microsoft.com/office/drawing/2012/chart" uri="{02D57815-91ED-43cb-92C2-25804820EDAC}">
+              <c15:datalabelsRange>
+                <c15:f>Tabelle1!$A$2:$A$3</c15:f>
+                <c15:dlblRangeCache>
+                  <c:ptCount val="2"/>
+                  <c:pt idx="0">
+                    <c:v>Item 1</c:v>
+                  </c:pt>
+                  <c:pt idx="1">
+                    <c:v>Item 2</c:v>
+                  </c:pt>
+                </c15:dlblRangeCache>
+              </c15:datalabelsRange>
+            </c:ext>
+            <c:ext xmlns:c16="http://schemas.microsoft.com/office/drawing/2014/chart" uri="{C3380CC4-5D6E-409C-BE32-E72D297353CC}">
+              <c16:uniqueId val="{00000001-5E61-426B-A026-4AA584F30620}"/>
+            </c:ext>
+          </c:extLst>
+        </c:ser>
+        <c:dLbls>
+          <c:showLegendKey val="0"/>
+          <c:showVal val="0"/>
+          <c:showCatName val="0"/>
+          <c:showSerName val="0"/>
+          <c:showPercent val="0"/>
+          <c:showBubbleSize val="0"/>
+        </c:dLbls>
+        <c:axId val="1957917232"/>
+        <c:axId val="2126909104"/>
+      </c:scatterChart>
+      <c:valAx>
+        <c:axId val="1957917232"/>
+        <c:scaling>
+          <c:orientation val="minMax"/>
+        </c:scaling>
+        <c:delete val="0"/>
+        <c:axPos val="b"/>
+        <c:majorGridlines>
+          <c:spPr>
+            <a:ln w="9525" cap="flat" cmpd="sng" algn="ctr">
+              <a:solidFill>
+                <a:schemeClr val="tx1">
+                  <a:lumMod val="15000"/>
+                  <a:lumOff val="85000"/>
+                </a:schemeClr>
+              </a:solidFill>
+              <a:round/>
+            </a:ln>
+            <a:effectLst/>
+          </c:spPr>
+        </c:majorGridlines>
+        <c:numFmt formatCode="General" sourceLinked="1"/>
+        <c:majorTickMark val="out"/>
+        <c:minorTickMark val="none"/>
+        <c:tickLblPos val="nextTo"/>
+        <c:spPr>
+          <a:noFill/>
+          <a:ln w="9525" cap="flat" cmpd="sng" algn="ctr">
+            <a:solidFill>
+              <a:schemeClr val="tx1">
+                <a:lumMod val="15000"/>
+                <a:lumOff val="85000"/>
+              </a:schemeClr>
+            </a:solidFill>
+            <a:round/>
+          </a:ln>
+          <a:effectLst/>
+        </c:spPr>
+        <c:txPr>
+          <a:bodyPr rot="-60000000" spcFirstLastPara="1" vertOverflow="ellipsis" vert="horz" wrap="square" anchor="ctr" anchorCtr="1"/>
+          <a:lstStyle/>
+          <a:p>
+            <a:pPr>
+              <a:defRPr sz="1197" b="0" i="0" u="none" strike="noStrike" kern="1200" baseline="0">
+                <a:solidFill>
+                  <a:schemeClr val="tx1">
+                    <a:lumMod val="65000"/>
+                    <a:lumOff val="35000"/>
+                  </a:schemeClr>
+                </a:solidFill>
+                <a:latin typeface="+mn-lt"/>
+                <a:ea typeface="+mn-ea"/>
+                <a:cs typeface="+mn-cs"/>
+              </a:defRPr>
+            </a:pPr>
+            <a:endParaRPr lang="de-DE"/>
+          </a:p>
+        </c:txPr>
+        <c:crossAx val="2126909104"/>
+        <c:crosses val="autoZero"/>
+        <c:crossBetween val="midCat"/>
+      </c:valAx>
+      <c:valAx>
+        <c:axId val="2126909104"/>
+        <c:scaling>
+          <c:orientation val="minMax"/>
+        </c:scaling>
+        <c:delete val="0"/>
+        <c:axPos val="l"/>
+        <c:majorGridlines>
+          <c:spPr>
+            <a:ln w="9525" cap="flat" cmpd="sng" algn="ctr">
+              <a:solidFill>
+                <a:schemeClr val="tx1">
+                  <a:lumMod val="15000"/>
+                  <a:lumOff val="85000"/>
+                </a:schemeClr>
+              </a:solidFill>
+              <a:round/>
+            </a:ln>
+            <a:effectLst/>
+          </c:spPr>
+        </c:majorGridlines>
+        <c:numFmt formatCode="General" sourceLinked="1"/>
+        <c:majorTickMark val="out"/>
+        <c:minorTickMark val="none"/>
+        <c:tickLblPos val="nextTo"/>
+        <c:spPr>
+          <a:noFill/>
+          <a:ln>
+            <a:noFill/>
+          </a:ln>
+          <a:effectLst/>
+        </c:spPr>
+        <c:txPr>
+          <a:bodyPr rot="-60000000" spcFirstLastPara="1" vertOverflow="ellipsis" vert="horz" wrap="square" anchor="ctr" anchorCtr="1"/>
+          <a:lstStyle/>
+          <a:p>
+            <a:pPr>
+              <a:defRPr sz="1197" b="0" i="0" u="none" strike="noStrike" kern="1200" baseline="0">
+                <a:solidFill>
+                  <a:schemeClr val="tx1">
+                    <a:lumMod val="65000"/>
+                    <a:lumOff val="35000"/>
+                  </a:schemeClr>
+                </a:solidFill>
+                <a:latin typeface="+mn-lt"/>
+                <a:ea typeface="+mn-ea"/>
+                <a:cs typeface="+mn-cs"/>
+              </a:defRPr>
+            </a:pPr>
+            <a:endParaRPr lang="de-DE"/>
+          </a:p>
+        </c:txPr>
+        <c:crossAx val="1957917232"/>
+        <c:crosses val="autoZero"/>
+        <c:crossBetween val="midCat"/>
+      </c:valAx>
+      <c:spPr>
+        <a:noFill/>
+        <a:ln>
+          <a:noFill/>
+        </a:ln>
+        <a:effectLst/>
+      </c:spPr>
+    </c:plotArea>
+    <c:plotVisOnly val="1"/>
+    <c:dispBlanksAs val="gap"/>
+    <c:extLst>
+      <c:ext xmlns:c16r3="http://schemas.microsoft.com/office/drawing/2017/03/chart" uri="{56B9EC1D-385E-4148-901F-78D8002777C0}">
+        <c16r3:dataDisplayOptions16>
+          <c16r3:dispNaAsBlank val="1"/>
+        </c16r3:dataDisplayOptions16>
+      </c:ext>
+    </c:extLst>
+    <c:showDLblsOverMax val="0"/>
+  </c:chart>
+  <c:spPr>
+    <a:noFill/>
+    <a:ln>
+      <a:noFill/>
+    </a:ln>
+    <a:effectLst/>
+  </c:spPr>
+  <c:txPr>
+    <a:bodyPr/>
+    <a:lstStyle/>
+    <a:p>
+      <a:pPr>
+        <a:defRPr/>
+      </a:pPr>
+      <a:endParaRPr lang="de-DE"/>
+    </a:p>
+  </c:txPr>
+  <c:externalData r:id="rId3">
     <c:autoUpdate val="0"/>
   </c:externalData>
 </c:chartSpace>
@@ -4338,7 +4896,7 @@
           <a:p>
             <a:fld id="{8FB60A0F-5ED1-45ED-A5D5-DB038E6B70D9}" type="datetimeFigureOut">
               <a:rPr lang="de-DE" smtClean="0"/>
-              <a:t>12.01.2023</a:t>
+              <a:t>20.01.2025</a:t>
             </a:fld>
             <a:endParaRPr lang="de-DE"/>
           </a:p>
@@ -4536,7 +5094,7 @@
           <a:p>
             <a:fld id="{8FB60A0F-5ED1-45ED-A5D5-DB038E6B70D9}" type="datetimeFigureOut">
               <a:rPr lang="de-DE" smtClean="0"/>
-              <a:t>12.01.2023</a:t>
+              <a:t>20.01.2025</a:t>
             </a:fld>
             <a:endParaRPr lang="de-DE"/>
           </a:p>
@@ -4744,7 +5302,7 @@
           <a:p>
             <a:fld id="{8FB60A0F-5ED1-45ED-A5D5-DB038E6B70D9}" type="datetimeFigureOut">
               <a:rPr lang="de-DE" smtClean="0"/>
-              <a:t>12.01.2023</a:t>
+              <a:t>20.01.2025</a:t>
             </a:fld>
             <a:endParaRPr lang="de-DE"/>
           </a:p>
@@ -4942,7 +5500,7 @@
           <a:p>
             <a:fld id="{8FB60A0F-5ED1-45ED-A5D5-DB038E6B70D9}" type="datetimeFigureOut">
               <a:rPr lang="de-DE" smtClean="0"/>
-              <a:t>12.01.2023</a:t>
+              <a:t>20.01.2025</a:t>
             </a:fld>
             <a:endParaRPr lang="de-DE"/>
           </a:p>
@@ -5217,7 +5775,7 @@
           <a:p>
             <a:fld id="{8FB60A0F-5ED1-45ED-A5D5-DB038E6B70D9}" type="datetimeFigureOut">
               <a:rPr lang="de-DE" smtClean="0"/>
-              <a:t>12.01.2023</a:t>
+              <a:t>20.01.2025</a:t>
             </a:fld>
             <a:endParaRPr lang="de-DE"/>
           </a:p>
@@ -5482,7 +6040,7 @@
           <a:p>
             <a:fld id="{8FB60A0F-5ED1-45ED-A5D5-DB038E6B70D9}" type="datetimeFigureOut">
               <a:rPr lang="de-DE" smtClean="0"/>
-              <a:t>12.01.2023</a:t>
+              <a:t>20.01.2025</a:t>
             </a:fld>
             <a:endParaRPr lang="de-DE"/>
           </a:p>
@@ -5894,7 +6452,7 @@
           <a:p>
             <a:fld id="{8FB60A0F-5ED1-45ED-A5D5-DB038E6B70D9}" type="datetimeFigureOut">
               <a:rPr lang="de-DE" smtClean="0"/>
-              <a:t>12.01.2023</a:t>
+              <a:t>20.01.2025</a:t>
             </a:fld>
             <a:endParaRPr lang="de-DE"/>
           </a:p>
@@ -6035,7 +6593,7 @@
           <a:p>
             <a:fld id="{8FB60A0F-5ED1-45ED-A5D5-DB038E6B70D9}" type="datetimeFigureOut">
               <a:rPr lang="de-DE" smtClean="0"/>
-              <a:t>12.01.2023</a:t>
+              <a:t>20.01.2025</a:t>
             </a:fld>
             <a:endParaRPr lang="de-DE"/>
           </a:p>
@@ -6148,7 +6706,7 @@
           <a:p>
             <a:fld id="{8FB60A0F-5ED1-45ED-A5D5-DB038E6B70D9}" type="datetimeFigureOut">
               <a:rPr lang="de-DE" smtClean="0"/>
-              <a:t>12.01.2023</a:t>
+              <a:t>20.01.2025</a:t>
             </a:fld>
             <a:endParaRPr lang="de-DE"/>
           </a:p>
@@ -6459,7 +7017,7 @@
           <a:p>
             <a:fld id="{8FB60A0F-5ED1-45ED-A5D5-DB038E6B70D9}" type="datetimeFigureOut">
               <a:rPr lang="de-DE" smtClean="0"/>
-              <a:t>12.01.2023</a:t>
+              <a:t>20.01.2025</a:t>
             </a:fld>
             <a:endParaRPr lang="de-DE"/>
           </a:p>
@@ -6747,7 +7305,7 @@
           <a:p>
             <a:fld id="{8FB60A0F-5ED1-45ED-A5D5-DB038E6B70D9}" type="datetimeFigureOut">
               <a:rPr lang="de-DE" smtClean="0"/>
-              <a:t>12.01.2023</a:t>
+              <a:t>20.01.2025</a:t>
             </a:fld>
             <a:endParaRPr lang="de-DE"/>
           </a:p>
@@ -6988,7 +7546,7 @@
           <a:p>
             <a:fld id="{8FB60A0F-5ED1-45ED-A5D5-DB038E6B70D9}" type="datetimeFigureOut">
               <a:rPr lang="de-DE" smtClean="0"/>
-              <a:t>12.01.2023</a:t>
+              <a:t>20.01.2025</a:t>
             </a:fld>
             <a:endParaRPr lang="de-DE"/>
           </a:p>
@@ -7476,7 +8034,7 @@
           <p:nvPr>
             <p:extLst>
               <p:ext uri="{D42A27DB-BD31-4B8C-83A1-F6EECF244321}">
-                <p14:modId xmlns:p14="http://schemas.microsoft.com/office/powerpoint/2010/main" val="2174470977"/>
+                <p14:modId xmlns:p14="http://schemas.microsoft.com/office/powerpoint/2010/main" val="1260098023"/>
               </p:ext>
             </p:extLst>
           </p:nvPr>
@@ -7553,6 +8111,64 @@
     <p:extLst>
       <p:ext uri="{BB962C8B-B14F-4D97-AF65-F5344CB8AC3E}">
         <p14:creationId xmlns:p14="http://schemas.microsoft.com/office/powerpoint/2010/main" val="634049618"/>
+      </p:ext>
+    </p:extLst>
+  </p:cSld>
+  <p:clrMapOvr>
+    <a:masterClrMapping/>
+  </p:clrMapOvr>
+</p:sld>
+</file>
+
+<file path=ppt/slides/slide4.xml><?xml version="1.0" encoding="utf-8"?>
+<p:sld xmlns:a="http://schemas.openxmlformats.org/drawingml/2006/main" xmlns:r="http://schemas.openxmlformats.org/officeDocument/2006/relationships" xmlns:p="http://schemas.openxmlformats.org/presentationml/2006/main">
+  <p:cSld>
+    <p:spTree>
+      <p:nvGrpSpPr>
+        <p:cNvPr id="1" name=""/>
+        <p:cNvGrpSpPr/>
+        <p:nvPr/>
+      </p:nvGrpSpPr>
+      <p:grpSpPr>
+        <a:xfrm>
+          <a:off x="0" y="0"/>
+          <a:ext cx="0" cy="0"/>
+          <a:chOff x="0" y="0"/>
+          <a:chExt cx="0" cy="0"/>
+        </a:xfrm>
+      </p:grpSpPr>
+      <p:graphicFrame>
+        <p:nvGraphicFramePr>
+          <p:cNvPr id="6" name="ScatterPointLabel">
+            <a:extLst>
+              <a:ext uri="{FF2B5EF4-FFF2-40B4-BE49-F238E27FC236}">
+                <a16:creationId xmlns:a16="http://schemas.microsoft.com/office/drawing/2014/main" id="{C687C97D-A731-4191-B8CE-878B34153102}"/>
+              </a:ext>
+            </a:extLst>
+          </p:cNvPr>
+          <p:cNvGraphicFramePr/>
+          <p:nvPr>
+            <p:extLst>
+              <p:ext uri="{D42A27DB-BD31-4B8C-83A1-F6EECF244321}">
+                <p14:modId xmlns:p14="http://schemas.microsoft.com/office/powerpoint/2010/main" val="2841181907"/>
+              </p:ext>
+            </p:extLst>
+          </p:nvPr>
+        </p:nvGraphicFramePr>
+        <p:xfrm>
+          <a:off x="1072339" y="656697"/>
+          <a:ext cx="7958772" cy="4770437"/>
+        </p:xfrm>
+        <a:graphic>
+          <a:graphicData uri="http://schemas.openxmlformats.org/drawingml/2006/chart">
+            <c:chart xmlns:c="http://schemas.openxmlformats.org/drawingml/2006/chart" xmlns:r="http://schemas.openxmlformats.org/officeDocument/2006/relationships" r:id="rId2"/>
+          </a:graphicData>
+        </a:graphic>
+      </p:graphicFrame>
+    </p:spTree>
+    <p:extLst>
+      <p:ext uri="{BB962C8B-B14F-4D97-AF65-F5344CB8AC3E}">
+        <p14:creationId xmlns:p14="http://schemas.microsoft.com/office/powerpoint/2010/main" val="2231265757"/>
       </p:ext>
     </p:extLst>
   </p:cSld>

</xml_diff>